<commit_message>
docs: Add project abstract and update zeroth review presentation.
</commit_message>
<xml_diff>
--- a/zeroth-review.pptx
+++ b/zeroth-review.pptx
@@ -10,13 +10,13 @@
   <p:sldIdLst>
     <p:sldId id="256" r:id="rId2"/>
     <p:sldId id="276" r:id="rId3"/>
-    <p:sldId id="257" r:id="rId4"/>
-    <p:sldId id="260" r:id="rId5"/>
-    <p:sldId id="258" r:id="rId6"/>
-    <p:sldId id="259" r:id="rId7"/>
-    <p:sldId id="275" r:id="rId8"/>
-    <p:sldId id="261" r:id="rId9"/>
-    <p:sldId id="262" r:id="rId10"/>
+    <p:sldId id="277" r:id="rId4"/>
+    <p:sldId id="257" r:id="rId5"/>
+    <p:sldId id="260" r:id="rId6"/>
+    <p:sldId id="258" r:id="rId7"/>
+    <p:sldId id="259" r:id="rId8"/>
+    <p:sldId id="275" r:id="rId9"/>
+    <p:sldId id="261" r:id="rId10"/>
     <p:sldId id="263" r:id="rId11"/>
     <p:sldId id="264" r:id="rId12"/>
     <p:sldId id="265" r:id="rId13"/>
@@ -263,7 +263,7 @@
       <p15:sldGuideLst xmlns:p15="http://schemas.microsoft.com/office/powerpoint/2012/main"/>
     </p:ext>
     <p:ext uri="GoogleSlidesCustomDataVersion2">
-      <go:slidesCustomData xmlns:go="http://customooxmlschemas.google.com/" xmlns:ahyp="http://schemas.microsoft.com/office/drawing/2018/hyperlinkcolor" xmlns:p15="http://schemas.microsoft.com/office/powerpoint/2012/main" xmlns:p14="http://schemas.microsoft.com/office/powerpoint/2010/main" xmlns:com="http://schemas.openxmlformats.org/drawingml/2006/compatibility" xmlns:pvml="urn:schemas-microsoft-com:office:powerpoint" xmlns:v="urn:schemas-microsoft-com:vml" xmlns:o="urn:schemas-microsoft-com:office:office" xmlns:dgm="http://schemas.openxmlformats.org/drawingml/2006/diagram" xmlns:c="http://schemas.openxmlformats.org/drawingml/2006/chart" xmlns:mv="urn:schemas-microsoft-com:mac:vml" xmlns:mc="http://schemas.openxmlformats.org/markup-compatibility/2006" xmlns="" r:id="rId25" roundtripDataSignature="AMtx7mg0kTNDwJ6dBoRWzcShxu/avlgfrw=="/>
+      <go:slidesCustomData xmlns="" xmlns:mc="http://schemas.openxmlformats.org/markup-compatibility/2006" xmlns:mv="urn:schemas-microsoft-com:mac:vml" xmlns:c="http://schemas.openxmlformats.org/drawingml/2006/chart" xmlns:dgm="http://schemas.openxmlformats.org/drawingml/2006/diagram" xmlns:o="urn:schemas-microsoft-com:office:office" xmlns:v="urn:schemas-microsoft-com:vml" xmlns:pvml="urn:schemas-microsoft-com:office:powerpoint" xmlns:com="http://schemas.openxmlformats.org/drawingml/2006/compatibility" xmlns:p14="http://schemas.microsoft.com/office/powerpoint/2010/main" xmlns:p15="http://schemas.microsoft.com/office/powerpoint/2012/main" xmlns:ahyp="http://schemas.microsoft.com/office/drawing/2018/hyperlinkcolor" xmlns:go="http://customooxmlschemas.google.com/" r:id="rId25" roundtripDataSignature="AMtx7mg0kTNDwJ6dBoRWzcShxu/avlgfrw=="/>
     </p:ext>
   </p:extLst>
 </p:presentation>
@@ -3069,6 +3069,151 @@
   <p:cSld>
     <p:spTree>
       <p:nvGrpSpPr>
+        <p:cNvPr id="1" name="Shape 95">
+          <a:extLst>
+            <a:ext uri="{FF2B5EF4-FFF2-40B4-BE49-F238E27FC236}">
+              <a16:creationId xmlns:a16="http://schemas.microsoft.com/office/drawing/2014/main" id="{70186280-7A27-6355-A122-6A781B35815E}"/>
+            </a:ext>
+          </a:extLst>
+        </p:cNvPr>
+        <p:cNvGrpSpPr/>
+        <p:nvPr/>
+      </p:nvGrpSpPr>
+      <p:grpSpPr>
+        <a:xfrm>
+          <a:off x="0" y="0"/>
+          <a:ext cx="0" cy="0"/>
+          <a:chOff x="0" y="0"/>
+          <a:chExt cx="0" cy="0"/>
+        </a:xfrm>
+      </p:grpSpPr>
+      <p:sp>
+        <p:nvSpPr>
+          <p:cNvPr id="96" name="Google Shape;96;p2:notes">
+            <a:extLst>
+              <a:ext uri="{FF2B5EF4-FFF2-40B4-BE49-F238E27FC236}">
+                <a16:creationId xmlns:a16="http://schemas.microsoft.com/office/drawing/2014/main" id="{D9991022-67D4-86A0-3CDF-7DDC99F5200B}"/>
+              </a:ext>
+            </a:extLst>
+          </p:cNvPr>
+          <p:cNvSpPr txBox="1">
+            <a:spLocks noGrp="1"/>
+          </p:cNvSpPr>
+          <p:nvPr>
+            <p:ph type="body" idx="1"/>
+          </p:nvPr>
+        </p:nvSpPr>
+        <p:spPr>
+          <a:xfrm>
+            <a:off x="685800" y="4400550"/>
+            <a:ext cx="5486400" cy="3600450"/>
+          </a:xfrm>
+          <a:prstGeom prst="rect">
+            <a:avLst/>
+          </a:prstGeom>
+          <a:noFill/>
+          <a:ln>
+            <a:noFill/>
+          </a:ln>
+        </p:spPr>
+        <p:txBody>
+          <a:bodyPr spcFirstLastPara="1" wrap="square" lIns="91425" tIns="45700" rIns="91425" bIns="45700" anchor="t" anchorCtr="0">
+            <a:noAutofit/>
+          </a:bodyPr>
+          <a:lstStyle/>
+          <a:p>
+            <a:pPr marL="0" lvl="0" indent="0" algn="l" rtl="0">
+              <a:lnSpc>
+                <a:spcPct val="100000"/>
+              </a:lnSpc>
+              <a:spcBef>
+                <a:spcPts val="0"/>
+              </a:spcBef>
+              <a:spcAft>
+                <a:spcPts val="0"/>
+              </a:spcAft>
+              <a:buSzPts val="1400"/>
+              <a:buNone/>
+            </a:pPr>
+            <a:endParaRPr/>
+          </a:p>
+        </p:txBody>
+      </p:sp>
+      <p:sp>
+        <p:nvSpPr>
+          <p:cNvPr id="97" name="Google Shape;97;p2:notes">
+            <a:extLst>
+              <a:ext uri="{FF2B5EF4-FFF2-40B4-BE49-F238E27FC236}">
+                <a16:creationId xmlns:a16="http://schemas.microsoft.com/office/drawing/2014/main" id="{A6167047-33AF-55B7-1494-04F3F9CDC1C0}"/>
+              </a:ext>
+            </a:extLst>
+          </p:cNvPr>
+          <p:cNvSpPr>
+            <a:spLocks noGrp="1" noRot="1" noChangeAspect="1"/>
+          </p:cNvSpPr>
+          <p:nvPr>
+            <p:ph type="sldImg" idx="2"/>
+          </p:nvPr>
+        </p:nvSpPr>
+        <p:spPr>
+          <a:xfrm>
+            <a:off x="685800" y="1143000"/>
+            <a:ext cx="5486400" cy="3086100"/>
+          </a:xfrm>
+          <a:custGeom>
+            <a:avLst/>
+            <a:gdLst/>
+            <a:ahLst/>
+            <a:cxnLst/>
+            <a:rect l="l" t="t" r="r" b="b"/>
+            <a:pathLst>
+              <a:path w="120000" h="120000" extrusionOk="0">
+                <a:moveTo>
+                  <a:pt x="0" y="0"/>
+                </a:moveTo>
+                <a:lnTo>
+                  <a:pt x="120000" y="0"/>
+                </a:lnTo>
+                <a:lnTo>
+                  <a:pt x="120000" y="120000"/>
+                </a:lnTo>
+                <a:lnTo>
+                  <a:pt x="0" y="120000"/>
+                </a:lnTo>
+                <a:close/>
+              </a:path>
+            </a:pathLst>
+          </a:custGeom>
+          <a:noFill/>
+          <a:ln w="12700" cap="flat" cmpd="sng">
+            <a:solidFill>
+              <a:srgbClr val="000000"/>
+            </a:solidFill>
+            <a:prstDash val="solid"/>
+            <a:round/>
+            <a:headEnd type="none" w="sm" len="sm"/>
+            <a:tailEnd type="none" w="sm" len="sm"/>
+          </a:ln>
+        </p:spPr>
+      </p:sp>
+    </p:spTree>
+    <p:extLst>
+      <p:ext uri="{BB962C8B-B14F-4D97-AF65-F5344CB8AC3E}">
+        <p14:creationId xmlns:p14="http://schemas.microsoft.com/office/powerpoint/2010/main" val="855551233"/>
+      </p:ext>
+    </p:extLst>
+  </p:cSld>
+  <p:clrMapOvr>
+    <a:masterClrMapping/>
+  </p:clrMapOvr>
+</p:notes>
+</file>
+
+<file path=ppt/notesSlides/notesSlide4.xml><?xml version="1.0" encoding="utf-8"?>
+<p:notes xmlns:a="http://schemas.openxmlformats.org/drawingml/2006/main" xmlns:r="http://schemas.openxmlformats.org/officeDocument/2006/relationships" xmlns:p="http://schemas.openxmlformats.org/presentationml/2006/main" showMasterSp="0" showMasterPhAnim="0">
+  <p:cSld>
+    <p:spTree>
+      <p:nvGrpSpPr>
         <p:cNvPr id="1" name="Shape 95"/>
         <p:cNvGrpSpPr/>
         <p:nvPr/>
@@ -3186,7 +3331,7 @@
 </p:notes>
 </file>
 
-<file path=ppt/notesSlides/notesSlide4.xml><?xml version="1.0" encoding="utf-8"?>
+<file path=ppt/notesSlides/notesSlide5.xml><?xml version="1.0" encoding="utf-8"?>
 <p:notes xmlns:a="http://schemas.openxmlformats.org/drawingml/2006/main" xmlns:r="http://schemas.openxmlformats.org/officeDocument/2006/relationships" xmlns:p="http://schemas.openxmlformats.org/presentationml/2006/main" showMasterSp="0" showMasterPhAnim="0">
   <p:cSld>
     <p:spTree>
@@ -3308,7 +3453,7 @@
 </p:notes>
 </file>
 
-<file path=ppt/notesSlides/notesSlide5.xml><?xml version="1.0" encoding="utf-8"?>
+<file path=ppt/notesSlides/notesSlide6.xml><?xml version="1.0" encoding="utf-8"?>
 <p:notes xmlns:a="http://schemas.openxmlformats.org/drawingml/2006/main" xmlns:r="http://schemas.openxmlformats.org/officeDocument/2006/relationships" xmlns:p="http://schemas.openxmlformats.org/presentationml/2006/main" showMasterSp="0" showMasterPhAnim="0">
   <p:cSld>
     <p:spTree>
@@ -3430,7 +3575,7 @@
 </p:notes>
 </file>
 
-<file path=ppt/notesSlides/notesSlide6.xml><?xml version="1.0" encoding="utf-8"?>
+<file path=ppt/notesSlides/notesSlide7.xml><?xml version="1.0" encoding="utf-8"?>
 <p:notes xmlns:a="http://schemas.openxmlformats.org/drawingml/2006/main" xmlns:r="http://schemas.openxmlformats.org/officeDocument/2006/relationships" xmlns:p="http://schemas.openxmlformats.org/presentationml/2006/main" showMasterSp="0" showMasterPhAnim="0">
   <p:cSld>
     <p:spTree>
@@ -3552,7 +3697,7 @@
 </p:notes>
 </file>
 
-<file path=ppt/notesSlides/notesSlide7.xml><?xml version="1.0" encoding="utf-8"?>
+<file path=ppt/notesSlides/notesSlide8.xml><?xml version="1.0" encoding="utf-8"?>
 <p:notes xmlns:a="http://schemas.openxmlformats.org/drawingml/2006/main" xmlns:r="http://schemas.openxmlformats.org/officeDocument/2006/relationships" xmlns:p="http://schemas.openxmlformats.org/presentationml/2006/main" showMasterSp="0" showMasterPhAnim="0">
   <p:cSld>
     <p:spTree>
@@ -3697,7 +3842,7 @@
 </p:notes>
 </file>
 
-<file path=ppt/notesSlides/notesSlide8.xml><?xml version="1.0" encoding="utf-8"?>
+<file path=ppt/notesSlides/notesSlide9.xml><?xml version="1.0" encoding="utf-8"?>
 <p:notes xmlns:a="http://schemas.openxmlformats.org/drawingml/2006/main" xmlns:r="http://schemas.openxmlformats.org/officeDocument/2006/relationships" xmlns:p="http://schemas.openxmlformats.org/presentationml/2006/main" showMasterSp="0" showMasterPhAnim="0">
   <p:cSld>
     <p:spTree>
@@ -3763,128 +3908,6 @@
       <p:sp>
         <p:nvSpPr>
           <p:cNvPr id="125" name="Google Shape;125;p6:notes"/>
-          <p:cNvSpPr>
-            <a:spLocks noGrp="1" noRot="1" noChangeAspect="1"/>
-          </p:cNvSpPr>
-          <p:nvPr>
-            <p:ph type="sldImg" idx="2"/>
-          </p:nvPr>
-        </p:nvSpPr>
-        <p:spPr>
-          <a:xfrm>
-            <a:off x="685800" y="1143000"/>
-            <a:ext cx="5486400" cy="3086100"/>
-          </a:xfrm>
-          <a:custGeom>
-            <a:avLst/>
-            <a:gdLst/>
-            <a:ahLst/>
-            <a:cxnLst/>
-            <a:rect l="l" t="t" r="r" b="b"/>
-            <a:pathLst>
-              <a:path w="120000" h="120000" extrusionOk="0">
-                <a:moveTo>
-                  <a:pt x="0" y="0"/>
-                </a:moveTo>
-                <a:lnTo>
-                  <a:pt x="120000" y="0"/>
-                </a:lnTo>
-                <a:lnTo>
-                  <a:pt x="120000" y="120000"/>
-                </a:lnTo>
-                <a:lnTo>
-                  <a:pt x="0" y="120000"/>
-                </a:lnTo>
-                <a:close/>
-              </a:path>
-            </a:pathLst>
-          </a:custGeom>
-          <a:noFill/>
-          <a:ln w="12700" cap="flat" cmpd="sng">
-            <a:solidFill>
-              <a:srgbClr val="000000"/>
-            </a:solidFill>
-            <a:prstDash val="solid"/>
-            <a:round/>
-            <a:headEnd type="none" w="sm" len="sm"/>
-            <a:tailEnd type="none" w="sm" len="sm"/>
-          </a:ln>
-        </p:spPr>
-      </p:sp>
-    </p:spTree>
-  </p:cSld>
-  <p:clrMapOvr>
-    <a:masterClrMapping/>
-  </p:clrMapOvr>
-</p:notes>
-</file>
-
-<file path=ppt/notesSlides/notesSlide9.xml><?xml version="1.0" encoding="utf-8"?>
-<p:notes xmlns:a="http://schemas.openxmlformats.org/drawingml/2006/main" xmlns:r="http://schemas.openxmlformats.org/officeDocument/2006/relationships" xmlns:p="http://schemas.openxmlformats.org/presentationml/2006/main" showMasterSp="0" showMasterPhAnim="0">
-  <p:cSld>
-    <p:spTree>
-      <p:nvGrpSpPr>
-        <p:cNvPr id="1" name="Shape 130"/>
-        <p:cNvGrpSpPr/>
-        <p:nvPr/>
-      </p:nvGrpSpPr>
-      <p:grpSpPr>
-        <a:xfrm>
-          <a:off x="0" y="0"/>
-          <a:ext cx="0" cy="0"/>
-          <a:chOff x="0" y="0"/>
-          <a:chExt cx="0" cy="0"/>
-        </a:xfrm>
-      </p:grpSpPr>
-      <p:sp>
-        <p:nvSpPr>
-          <p:cNvPr id="131" name="Google Shape;131;p7:notes"/>
-          <p:cNvSpPr txBox="1">
-            <a:spLocks noGrp="1"/>
-          </p:cNvSpPr>
-          <p:nvPr>
-            <p:ph type="body" idx="1"/>
-          </p:nvPr>
-        </p:nvSpPr>
-        <p:spPr>
-          <a:xfrm>
-            <a:off x="685800" y="4400550"/>
-            <a:ext cx="5486400" cy="3600450"/>
-          </a:xfrm>
-          <a:prstGeom prst="rect">
-            <a:avLst/>
-          </a:prstGeom>
-          <a:noFill/>
-          <a:ln>
-            <a:noFill/>
-          </a:ln>
-        </p:spPr>
-        <p:txBody>
-          <a:bodyPr spcFirstLastPara="1" wrap="square" lIns="91425" tIns="45700" rIns="91425" bIns="45700" anchor="t" anchorCtr="0">
-            <a:noAutofit/>
-          </a:bodyPr>
-          <a:lstStyle/>
-          <a:p>
-            <a:pPr marL="0" lvl="0" indent="0" algn="l" rtl="0">
-              <a:lnSpc>
-                <a:spcPct val="100000"/>
-              </a:lnSpc>
-              <a:spcBef>
-                <a:spcPts val="0"/>
-              </a:spcBef>
-              <a:spcAft>
-                <a:spcPts val="0"/>
-              </a:spcAft>
-              <a:buSzPts val="1400"/>
-              <a:buNone/>
-            </a:pPr>
-            <a:endParaRPr/>
-          </a:p>
-        </p:txBody>
-      </p:sp>
-      <p:sp>
-        <p:nvSpPr>
-          <p:cNvPr id="132" name="Google Shape;132;p7:notes"/>
           <p:cNvSpPr>
             <a:spLocks noGrp="1" noRot="1" noChangeAspect="1"/>
           </p:cNvSpPr>
@@ -4915,13 +4938,13 @@
   <p:clrMapOvr>
     <a:masterClrMapping/>
   </p:clrMapOvr>
-  <mc:AlternateContent xmlns:mc="http://schemas.openxmlformats.org/markup-compatibility/2006">
-    <mc:Choice xmlns:p14="http://schemas.microsoft.com/office/powerpoint/2010/main" Requires="p14">
+  <mc:AlternateContent xmlns:mc="http://schemas.openxmlformats.org/markup-compatibility/2006" xmlns:p14="http://schemas.microsoft.com/office/powerpoint/2010/main">
+    <mc:Choice Requires="p14">
       <p:transition spd="slow" p14:dur="1500">
         <p:split orient="vert"/>
       </p:transition>
     </mc:Choice>
-    <mc:Fallback>
+    <mc:Fallback xmlns="">
       <p:transition spd="slow">
         <p:split orient="vert"/>
       </p:transition>
@@ -5903,13 +5926,13 @@
   <p:clrMapOvr>
     <a:masterClrMapping/>
   </p:clrMapOvr>
-  <mc:AlternateContent xmlns:mc="http://schemas.openxmlformats.org/markup-compatibility/2006">
-    <mc:Choice xmlns:p14="http://schemas.microsoft.com/office/powerpoint/2010/main" Requires="p14">
+  <mc:AlternateContent xmlns:mc="http://schemas.openxmlformats.org/markup-compatibility/2006" xmlns:p14="http://schemas.microsoft.com/office/powerpoint/2010/main">
+    <mc:Choice Requires="p14">
       <p:transition spd="slow" p14:dur="1500">
         <p:split orient="vert"/>
       </p:transition>
     </mc:Choice>
-    <mc:Fallback>
+    <mc:Fallback xmlns="">
       <p:transition spd="slow">
         <p:split orient="vert"/>
       </p:transition>
@@ -6891,13 +6914,13 @@
   <p:clrMapOvr>
     <a:masterClrMapping/>
   </p:clrMapOvr>
-  <mc:AlternateContent xmlns:mc="http://schemas.openxmlformats.org/markup-compatibility/2006">
-    <mc:Choice xmlns:p14="http://schemas.microsoft.com/office/powerpoint/2010/main" Requires="p14">
+  <mc:AlternateContent xmlns:mc="http://schemas.openxmlformats.org/markup-compatibility/2006" xmlns:p14="http://schemas.microsoft.com/office/powerpoint/2010/main">
+    <mc:Choice Requires="p14">
       <p:transition spd="slow" p14:dur="1500">
         <p:split orient="vert"/>
       </p:transition>
     </mc:Choice>
-    <mc:Fallback>
+    <mc:Fallback xmlns="">
       <p:transition spd="slow">
         <p:split orient="vert"/>
       </p:transition>
@@ -7879,13 +7902,13 @@
   <p:clrMapOvr>
     <a:masterClrMapping/>
   </p:clrMapOvr>
-  <mc:AlternateContent xmlns:mc="http://schemas.openxmlformats.org/markup-compatibility/2006">
-    <mc:Choice xmlns:p14="http://schemas.microsoft.com/office/powerpoint/2010/main" Requires="p14">
+  <mc:AlternateContent xmlns:mc="http://schemas.openxmlformats.org/markup-compatibility/2006" xmlns:p14="http://schemas.microsoft.com/office/powerpoint/2010/main">
+    <mc:Choice Requires="p14">
       <p:transition spd="slow" p14:dur="1500">
         <p:split orient="vert"/>
       </p:transition>
     </mc:Choice>
-    <mc:Fallback>
+    <mc:Fallback xmlns="">
       <p:transition spd="slow">
         <p:split orient="vert"/>
       </p:transition>
@@ -8904,13 +8927,13 @@
   <p:clrMapOvr>
     <a:masterClrMapping/>
   </p:clrMapOvr>
-  <mc:AlternateContent xmlns:mc="http://schemas.openxmlformats.org/markup-compatibility/2006">
-    <mc:Choice xmlns:p14="http://schemas.microsoft.com/office/powerpoint/2010/main" Requires="p14">
+  <mc:AlternateContent xmlns:mc="http://schemas.openxmlformats.org/markup-compatibility/2006" xmlns:p14="http://schemas.microsoft.com/office/powerpoint/2010/main">
+    <mc:Choice Requires="p14">
       <p:transition spd="slow" p14:dur="1500">
         <p:split orient="vert"/>
       </p:transition>
     </mc:Choice>
-    <mc:Fallback>
+    <mc:Fallback xmlns="">
       <p:transition spd="slow">
         <p:split orient="vert"/>
       </p:transition>
@@ -10079,13 +10102,13 @@
   <p:clrMapOvr>
     <a:masterClrMapping/>
   </p:clrMapOvr>
-  <mc:AlternateContent xmlns:mc="http://schemas.openxmlformats.org/markup-compatibility/2006">
-    <mc:Choice xmlns:p14="http://schemas.microsoft.com/office/powerpoint/2010/main" Requires="p14">
+  <mc:AlternateContent xmlns:mc="http://schemas.openxmlformats.org/markup-compatibility/2006" xmlns:p14="http://schemas.microsoft.com/office/powerpoint/2010/main">
+    <mc:Choice Requires="p14">
       <p:transition spd="slow" p14:dur="1500">
         <p:split orient="vert"/>
       </p:transition>
     </mc:Choice>
-    <mc:Fallback>
+    <mc:Fallback xmlns="">
       <p:transition spd="slow">
         <p:split orient="vert"/>
       </p:transition>
@@ -11628,13 +11651,13 @@
   <p:clrMapOvr>
     <a:masterClrMapping/>
   </p:clrMapOvr>
-  <mc:AlternateContent xmlns:mc="http://schemas.openxmlformats.org/markup-compatibility/2006">
-    <mc:Choice xmlns:p14="http://schemas.microsoft.com/office/powerpoint/2010/main" Requires="p14">
+  <mc:AlternateContent xmlns:mc="http://schemas.openxmlformats.org/markup-compatibility/2006" xmlns:p14="http://schemas.microsoft.com/office/powerpoint/2010/main">
+    <mc:Choice Requires="p14">
       <p:transition spd="slow" p14:dur="1500">
         <p:split orient="vert"/>
       </p:transition>
     </mc:Choice>
-    <mc:Fallback>
+    <mc:Fallback xmlns="">
       <p:transition spd="slow">
         <p:split orient="vert"/>
       </p:transition>
@@ -12429,13 +12452,13 @@
   <p:clrMapOvr>
     <a:masterClrMapping/>
   </p:clrMapOvr>
-  <mc:AlternateContent xmlns:mc="http://schemas.openxmlformats.org/markup-compatibility/2006">
-    <mc:Choice xmlns:p14="http://schemas.microsoft.com/office/powerpoint/2010/main" Requires="p14">
+  <mc:AlternateContent xmlns:mc="http://schemas.openxmlformats.org/markup-compatibility/2006" xmlns:p14="http://schemas.microsoft.com/office/powerpoint/2010/main">
+    <mc:Choice Requires="p14">
       <p:transition spd="slow" p14:dur="1500">
         <p:split orient="vert"/>
       </p:transition>
     </mc:Choice>
-    <mc:Fallback>
+    <mc:Fallback xmlns="">
       <p:transition spd="slow">
         <p:split orient="vert"/>
       </p:transition>
@@ -13067,13 +13090,13 @@
   <p:clrMapOvr>
     <a:masterClrMapping/>
   </p:clrMapOvr>
-  <mc:AlternateContent xmlns:mc="http://schemas.openxmlformats.org/markup-compatibility/2006">
-    <mc:Choice xmlns:p14="http://schemas.microsoft.com/office/powerpoint/2010/main" Requires="p14">
+  <mc:AlternateContent xmlns:mc="http://schemas.openxmlformats.org/markup-compatibility/2006" xmlns:p14="http://schemas.microsoft.com/office/powerpoint/2010/main">
+    <mc:Choice Requires="p14">
       <p:transition spd="slow" p14:dur="1500">
         <p:split orient="vert"/>
       </p:transition>
     </mc:Choice>
-    <mc:Fallback>
+    <mc:Fallback xmlns="">
       <p:transition spd="slow">
         <p:split orient="vert"/>
       </p:transition>
@@ -14243,13 +14266,13 @@
   <p:clrMapOvr>
     <a:masterClrMapping/>
   </p:clrMapOvr>
-  <mc:AlternateContent xmlns:mc="http://schemas.openxmlformats.org/markup-compatibility/2006">
-    <mc:Choice xmlns:p14="http://schemas.microsoft.com/office/powerpoint/2010/main" Requires="p14">
+  <mc:AlternateContent xmlns:mc="http://schemas.openxmlformats.org/markup-compatibility/2006" xmlns:p14="http://schemas.microsoft.com/office/powerpoint/2010/main">
+    <mc:Choice Requires="p14">
       <p:transition spd="slow" p14:dur="1500">
         <p:split orient="vert"/>
       </p:transition>
     </mc:Choice>
-    <mc:Fallback>
+    <mc:Fallback xmlns="">
       <p:transition spd="slow">
         <p:split orient="vert"/>
       </p:transition>
@@ -15256,13 +15279,13 @@
   <p:clrMapOvr>
     <a:masterClrMapping/>
   </p:clrMapOvr>
-  <mc:AlternateContent xmlns:mc="http://schemas.openxmlformats.org/markup-compatibility/2006">
-    <mc:Choice xmlns:p14="http://schemas.microsoft.com/office/powerpoint/2010/main" Requires="p14">
+  <mc:AlternateContent xmlns:mc="http://schemas.openxmlformats.org/markup-compatibility/2006" xmlns:p14="http://schemas.microsoft.com/office/powerpoint/2010/main">
+    <mc:Choice Requires="p14">
       <p:transition spd="slow" p14:dur="1500">
         <p:split orient="vert"/>
       </p:transition>
     </mc:Choice>
-    <mc:Fallback>
+    <mc:Fallback xmlns="">
       <p:transition spd="slow">
         <p:split orient="vert"/>
       </p:transition>
@@ -16665,13 +16688,13 @@
     <p:sldLayoutId id="2147483658" r:id="rId10"/>
     <p:sldLayoutId id="2147483659" r:id="rId11"/>
   </p:sldLayoutIdLst>
-  <mc:AlternateContent xmlns:mc="http://schemas.openxmlformats.org/markup-compatibility/2006">
-    <mc:Choice xmlns:p14="http://schemas.microsoft.com/office/powerpoint/2010/main" Requires="p14">
+  <mc:AlternateContent xmlns:mc="http://schemas.openxmlformats.org/markup-compatibility/2006" xmlns:p14="http://schemas.microsoft.com/office/powerpoint/2010/main">
+    <mc:Choice Requires="p14">
       <p:transition spd="slow" p14:dur="1500">
         <p:split orient="vert"/>
       </p:transition>
     </mc:Choice>
-    <mc:Fallback>
+    <mc:Fallback xmlns="">
       <p:transition spd="slow">
         <p:split orient="vert"/>
       </p:transition>
@@ -18254,13 +18277,13 @@
   <p:clrMapOvr>
     <a:masterClrMapping/>
   </p:clrMapOvr>
-  <mc:AlternateContent xmlns:mc="http://schemas.openxmlformats.org/markup-compatibility/2006">
-    <mc:Choice xmlns:p14="http://schemas.microsoft.com/office/powerpoint/2010/main" Requires="p14">
+  <mc:AlternateContent xmlns:mc="http://schemas.openxmlformats.org/markup-compatibility/2006" xmlns:p14="http://schemas.microsoft.com/office/powerpoint/2010/main">
+    <mc:Choice Requires="p14">
       <p:transition spd="slow" p14:dur="1500">
         <p:split orient="vert"/>
       </p:transition>
     </mc:Choice>
-    <mc:Fallback>
+    <mc:Fallback xmlns="">
       <p:transition spd="slow">
         <p:split orient="vert"/>
       </p:transition>
@@ -18504,8 +18527,8 @@
         </p:blipFill>
         <p:spPr>
           <a:xfrm>
-            <a:off x="659424" y="814531"/>
-            <a:ext cx="11087100" cy="5406159"/>
+            <a:off x="720435" y="814532"/>
+            <a:ext cx="10892083" cy="5406159"/>
           </a:xfrm>
           <a:prstGeom prst="rect">
             <a:avLst/>
@@ -18517,13 +18540,13 @@
   <p:clrMapOvr>
     <a:masterClrMapping/>
   </p:clrMapOvr>
-  <mc:AlternateContent xmlns:mc="http://schemas.openxmlformats.org/markup-compatibility/2006">
-    <mc:Choice xmlns:p14="http://schemas.microsoft.com/office/powerpoint/2010/main" Requires="p14">
+  <mc:AlternateContent xmlns:mc="http://schemas.openxmlformats.org/markup-compatibility/2006" xmlns:p14="http://schemas.microsoft.com/office/powerpoint/2010/main">
+    <mc:Choice Requires="p14">
       <p:transition spd="slow" p14:dur="1500">
         <p:split orient="vert"/>
       </p:transition>
     </mc:Choice>
-    <mc:Fallback>
+    <mc:Fallback xmlns="">
       <p:transition spd="slow">
         <p:split orient="vert"/>
       </p:transition>
@@ -18941,13 +18964,13 @@
   <p:clrMapOvr>
     <a:masterClrMapping/>
   </p:clrMapOvr>
-  <mc:AlternateContent xmlns:mc="http://schemas.openxmlformats.org/markup-compatibility/2006">
-    <mc:Choice xmlns:p14="http://schemas.microsoft.com/office/powerpoint/2010/main" Requires="p14">
+  <mc:AlternateContent xmlns:mc="http://schemas.openxmlformats.org/markup-compatibility/2006" xmlns:p14="http://schemas.microsoft.com/office/powerpoint/2010/main">
+    <mc:Choice Requires="p14">
       <p:transition spd="slow" p14:dur="1500">
         <p:split orient="vert"/>
       </p:transition>
     </mc:Choice>
-    <mc:Fallback>
+    <mc:Fallback xmlns="">
       <p:transition spd="slow">
         <p:split orient="vert"/>
       </p:transition>
@@ -19254,13 +19277,13 @@
   <p:clrMapOvr>
     <a:masterClrMapping/>
   </p:clrMapOvr>
-  <mc:AlternateContent xmlns:mc="http://schemas.openxmlformats.org/markup-compatibility/2006">
-    <mc:Choice xmlns:p14="http://schemas.microsoft.com/office/powerpoint/2010/main" Requires="p14">
+  <mc:AlternateContent xmlns:mc="http://schemas.openxmlformats.org/markup-compatibility/2006" xmlns:p14="http://schemas.microsoft.com/office/powerpoint/2010/main">
+    <mc:Choice Requires="p14">
       <p:transition spd="slow" p14:dur="1500">
         <p:split orient="vert"/>
       </p:transition>
     </mc:Choice>
-    <mc:Fallback>
+    <mc:Fallback xmlns="">
       <p:transition spd="slow">
         <p:split orient="vert"/>
       </p:transition>
@@ -19992,13 +20015,13 @@
   <p:clrMapOvr>
     <a:masterClrMapping/>
   </p:clrMapOvr>
-  <mc:AlternateContent xmlns:mc="http://schemas.openxmlformats.org/markup-compatibility/2006">
-    <mc:Choice xmlns:p14="http://schemas.microsoft.com/office/powerpoint/2010/main" Requires="p14">
+  <mc:AlternateContent xmlns:mc="http://schemas.openxmlformats.org/markup-compatibility/2006" xmlns:p14="http://schemas.microsoft.com/office/powerpoint/2010/main">
+    <mc:Choice Requires="p14">
       <p:transition spd="slow" p14:dur="1500">
         <p:split orient="vert"/>
       </p:transition>
     </mc:Choice>
-    <mc:Fallback>
+    <mc:Fallback xmlns="">
       <p:transition spd="slow">
         <p:split orient="vert"/>
       </p:transition>
@@ -20799,13 +20822,13 @@
   <p:clrMapOvr>
     <a:masterClrMapping/>
   </p:clrMapOvr>
-  <mc:AlternateContent xmlns:mc="http://schemas.openxmlformats.org/markup-compatibility/2006">
-    <mc:Choice xmlns:p14="http://schemas.microsoft.com/office/powerpoint/2010/main" Requires="p14">
+  <mc:AlternateContent xmlns:mc="http://schemas.openxmlformats.org/markup-compatibility/2006" xmlns:p14="http://schemas.microsoft.com/office/powerpoint/2010/main">
+    <mc:Choice Requires="p14">
       <p:transition spd="slow" p14:dur="1500">
         <p:split orient="vert"/>
       </p:transition>
     </mc:Choice>
-    <mc:Fallback>
+    <mc:Fallback xmlns="">
       <p:transition spd="slow">
         <p:split orient="vert"/>
       </p:transition>
@@ -21630,13 +21653,13 @@
   <p:clrMapOvr>
     <a:masterClrMapping/>
   </p:clrMapOvr>
-  <mc:AlternateContent xmlns:mc="http://schemas.openxmlformats.org/markup-compatibility/2006">
-    <mc:Choice xmlns:p14="http://schemas.microsoft.com/office/powerpoint/2010/main" Requires="p14">
+  <mc:AlternateContent xmlns:mc="http://schemas.openxmlformats.org/markup-compatibility/2006" xmlns:p14="http://schemas.microsoft.com/office/powerpoint/2010/main">
+    <mc:Choice Requires="p14">
       <p:transition spd="slow" p14:dur="1500">
         <p:split orient="vert"/>
       </p:transition>
     </mc:Choice>
-    <mc:Fallback>
+    <mc:Fallback xmlns="">
       <p:transition spd="slow">
         <p:split orient="vert"/>
       </p:transition>
@@ -22084,13 +22107,13 @@
   <p:clrMapOvr>
     <a:masterClrMapping/>
   </p:clrMapOvr>
-  <mc:AlternateContent xmlns:mc="http://schemas.openxmlformats.org/markup-compatibility/2006">
-    <mc:Choice xmlns:p14="http://schemas.microsoft.com/office/powerpoint/2010/main" Requires="p14">
+  <mc:AlternateContent xmlns:mc="http://schemas.openxmlformats.org/markup-compatibility/2006" xmlns:p14="http://schemas.microsoft.com/office/powerpoint/2010/main">
+    <mc:Choice Requires="p14">
       <p:transition spd="slow" p14:dur="1500">
         <p:split orient="vert"/>
       </p:transition>
     </mc:Choice>
-    <mc:Fallback>
+    <mc:Fallback xmlns="">
       <p:transition spd="slow">
         <p:split orient="vert"/>
       </p:transition>
@@ -22370,13 +22393,13 @@
   <p:clrMapOvr>
     <a:masterClrMapping/>
   </p:clrMapOvr>
-  <mc:AlternateContent xmlns:mc="http://schemas.openxmlformats.org/markup-compatibility/2006">
-    <mc:Choice xmlns:p14="http://schemas.microsoft.com/office/powerpoint/2010/main" Requires="p14">
+  <mc:AlternateContent xmlns:mc="http://schemas.openxmlformats.org/markup-compatibility/2006" xmlns:p14="http://schemas.microsoft.com/office/powerpoint/2010/main">
+    <mc:Choice Requires="p14">
       <p:transition spd="slow" p14:dur="1500">
         <p:split orient="vert"/>
       </p:transition>
     </mc:Choice>
-    <mc:Fallback>
+    <mc:Fallback xmlns="">
       <p:transition spd="slow">
         <p:split orient="vert"/>
       </p:transition>
@@ -22927,13 +22950,13 @@
   <p:clrMapOvr>
     <a:masterClrMapping/>
   </p:clrMapOvr>
-  <mc:AlternateContent xmlns:mc="http://schemas.openxmlformats.org/markup-compatibility/2006">
-    <mc:Choice xmlns:p14="http://schemas.microsoft.com/office/powerpoint/2010/main" Requires="p14">
+  <mc:AlternateContent xmlns:mc="http://schemas.openxmlformats.org/markup-compatibility/2006" xmlns:p14="http://schemas.microsoft.com/office/powerpoint/2010/main">
+    <mc:Choice Requires="p14">
       <p:transition spd="slow" p14:dur="1500">
         <p:split orient="vert"/>
       </p:transition>
     </mc:Choice>
-    <mc:Fallback>
+    <mc:Fallback xmlns="">
       <p:transition spd="slow">
         <p:split orient="vert"/>
       </p:transition>
@@ -22971,8 +22994,8 @@
         </p:nvSpPr>
         <p:spPr>
           <a:xfrm>
-            <a:off x="838200" y="1968412"/>
-            <a:ext cx="10515600" cy="2770642"/>
+            <a:off x="838200" y="928099"/>
+            <a:ext cx="10515600" cy="5271543"/>
           </a:xfrm>
           <a:prstGeom prst="rect">
             <a:avLst/>
@@ -22990,25 +23013,18 @@
         </p:spPr>
         <p:txBody>
           <a:bodyPr spcFirstLastPara="1" wrap="square" lIns="91425" tIns="45700" rIns="91425" bIns="45700" anchor="t" anchorCtr="0">
-            <a:normAutofit/>
+            <a:normAutofit fontScale="85000" lnSpcReduction="20000"/>
           </a:bodyPr>
           <a:lstStyle/>
           <a:p>
-            <a:pPr marL="0" lvl="0" indent="0" algn="l" rtl="0">
+            <a:pPr marL="0" lvl="0" indent="0" algn="just">
               <a:lnSpc>
                 <a:spcPct val="115000"/>
               </a:lnSpc>
               <a:spcBef>
                 <a:spcPts val="0"/>
               </a:spcBef>
-              <a:spcAft>
-                <a:spcPts val="0"/>
-              </a:spcAft>
-              <a:buClr>
-                <a:schemeClr val="dk1"/>
-              </a:buClr>
               <a:buSzPct val="45833"/>
-              <a:buFont typeface="Arial"/>
               <a:buNone/>
             </a:pPr>
             <a:r>
@@ -23018,64 +23034,462 @@
                 </a:solidFill>
                 <a:latin typeface="Cambria"/>
                 <a:ea typeface="Cambria"/>
-                <a:cs typeface="Cambria"/>
-                <a:sym typeface="Cambria"/>
-              </a:rPr>
-              <a:t>Aim of the project</a:t>
-            </a:r>
-            <a:endParaRPr sz="2400" dirty="0">
-              <a:solidFill>
-                <a:srgbClr val="C00052"/>
-              </a:solidFill>
-              <a:latin typeface="Cambria"/>
-              <a:ea typeface="Cambria"/>
-              <a:cs typeface="Cambria"/>
-              <a:sym typeface="Cambria"/>
-            </a:endParaRPr>
-          </a:p>
-          <a:p>
-            <a:pPr marL="0" lvl="0" indent="0" algn="l" rtl="0">
-              <a:lnSpc>
-                <a:spcPct val="115000"/>
-              </a:lnSpc>
-              <a:spcBef>
-                <a:spcPts val="0"/>
-              </a:spcBef>
-              <a:spcAft>
-                <a:spcPts val="0"/>
-              </a:spcAft>
-              <a:buClr>
-                <a:schemeClr val="dk1"/>
-              </a:buClr>
-              <a:buSzPct val="45833"/>
-              <a:buFont typeface="Arial"/>
-              <a:buNone/>
-            </a:pPr>
-            <a:r>
-              <a:rPr lang="en-US" sz="2400" dirty="0">
-                <a:solidFill>
-                  <a:srgbClr val="C00052"/>
-                </a:solidFill>
-                <a:latin typeface="Cambria"/>
-                <a:ea typeface="Cambria"/>
-                <a:cs typeface="Cambria"/>
+                <a:cs typeface="Times New Roman" panose="02020603050405020304" pitchFamily="18" charset="0"/>
                 <a:sym typeface="Cambria"/>
               </a:rPr>
               <a:t>	</a:t>
             </a:r>
             <a:r>
-              <a:rPr lang="en-US" sz="2000" dirty="0">
-                <a:latin typeface="Cambria"/>
+              <a:rPr lang="en-US" sz="1900" dirty="0" err="1">
+                <a:latin typeface="Times New Roman" panose="02020603050405020304" pitchFamily="18" charset="0"/>
                 <a:ea typeface="Cambria"/>
-                <a:cs typeface="Cambria"/>
+                <a:cs typeface="Times New Roman" panose="02020603050405020304" pitchFamily="18" charset="0"/>
                 <a:sym typeface="Cambria"/>
               </a:rPr>
-              <a:t>The project aims to enhance yoga practice using AI-based pose detection, personalized training insights, and real-time analytics. By integrating React and TensorFlow for machine learning, it provides users with an interactive and engaging platform to track their yoga sessions, analyze progress, and receive guidance with peaceful background music to improve focus and relaxation.</a:t>
+              <a:t>ELocate</a:t>
             </a:r>
-            <a:endParaRPr sz="2000" dirty="0">
-              <a:latin typeface="Cambria"/>
+            <a:r>
+              <a:rPr lang="en-US" sz="1900" dirty="0">
+                <a:latin typeface="Times New Roman" panose="02020603050405020304" pitchFamily="18" charset="0"/>
+                <a:ea typeface="Cambria"/>
+                <a:cs typeface="Times New Roman" panose="02020603050405020304" pitchFamily="18" charset="0"/>
+                <a:sym typeface="Cambria"/>
+              </a:rPr>
+              <a:t> is an AI-powered e-waste management platform connecting citizens with certified recycling facilities across India. Using Faster R-CNN for device recognition, Next.js/Spring Boot architecture, and </a:t>
+            </a:r>
+            <a:r>
+              <a:rPr lang="en-US" sz="1900" dirty="0" err="1">
+                <a:latin typeface="Times New Roman" panose="02020603050405020304" pitchFamily="18" charset="0"/>
+                <a:ea typeface="Cambria"/>
+                <a:cs typeface="Times New Roman" panose="02020603050405020304" pitchFamily="18" charset="0"/>
+                <a:sym typeface="Cambria"/>
+              </a:rPr>
+              <a:t>MapBox</a:t>
+            </a:r>
+            <a:r>
+              <a:rPr lang="en-US" sz="1900" dirty="0">
+                <a:latin typeface="Times New Roman" panose="02020603050405020304" pitchFamily="18" charset="0"/>
+                <a:ea typeface="Cambria"/>
+                <a:cs typeface="Times New Roman" panose="02020603050405020304" pitchFamily="18" charset="0"/>
+                <a:sym typeface="Cambria"/>
+              </a:rPr>
+              <a:t> integration, it addresses India's 3.2M </a:t>
+            </a:r>
+            <a:r>
+              <a:rPr lang="en-US" sz="1900" dirty="0" err="1">
+                <a:latin typeface="Times New Roman" panose="02020603050405020304" pitchFamily="18" charset="0"/>
+                <a:ea typeface="Cambria"/>
+                <a:cs typeface="Times New Roman" panose="02020603050405020304" pitchFamily="18" charset="0"/>
+                <a:sym typeface="Cambria"/>
+              </a:rPr>
+              <a:t>tonnes</a:t>
+            </a:r>
+            <a:r>
+              <a:rPr lang="en-US" sz="1900" dirty="0">
+                <a:latin typeface="Times New Roman" panose="02020603050405020304" pitchFamily="18" charset="0"/>
+                <a:ea typeface="Cambria"/>
+                <a:cs typeface="Times New Roman" panose="02020603050405020304" pitchFamily="18" charset="0"/>
+                <a:sym typeface="Cambria"/>
+              </a:rPr>
+              <a:t> annual e-waste crisis where only 10% is properly recycled. The system features role-based dashboards, AI chatbot assistance, gamification, and QR-verified pickups to increase recycling rates by 15-20% while ensuring compliance with E-Waste Management Rules 2016.</a:t>
+            </a:r>
+          </a:p>
+          <a:p>
+            <a:pPr marL="0" lvl="0" indent="0" algn="just">
+              <a:lnSpc>
+                <a:spcPct val="115000"/>
+              </a:lnSpc>
+              <a:spcBef>
+                <a:spcPts val="0"/>
+              </a:spcBef>
+              <a:buSzPct val="45833"/>
+              <a:buNone/>
+            </a:pPr>
+            <a:endParaRPr lang="en-US" sz="1600" dirty="0">
+              <a:latin typeface="Times New Roman" panose="02020603050405020304" pitchFamily="18" charset="0"/>
               <a:ea typeface="Cambria"/>
-              <a:cs typeface="Cambria"/>
+              <a:cs typeface="Times New Roman" panose="02020603050405020304" pitchFamily="18" charset="0"/>
+              <a:sym typeface="Cambria"/>
+            </a:endParaRPr>
+          </a:p>
+          <a:p>
+            <a:pPr marL="0" lvl="0" indent="0" algn="just">
+              <a:lnSpc>
+                <a:spcPct val="115000"/>
+              </a:lnSpc>
+              <a:spcBef>
+                <a:spcPts val="0"/>
+              </a:spcBef>
+              <a:buSzPct val="45833"/>
+              <a:buNone/>
+            </a:pPr>
+            <a:r>
+              <a:rPr lang="en-US" sz="1600" b="1" dirty="0">
+                <a:latin typeface="Times New Roman" panose="02020603050405020304" pitchFamily="18" charset="0"/>
+                <a:ea typeface="Cambria"/>
+                <a:cs typeface="Times New Roman" panose="02020603050405020304" pitchFamily="18" charset="0"/>
+                <a:sym typeface="Cambria"/>
+              </a:rPr>
+              <a:t>AI-POWERED DEVICE RECOGNITION</a:t>
+            </a:r>
+          </a:p>
+          <a:p>
+            <a:pPr marL="0" lvl="0" indent="0" algn="just">
+              <a:lnSpc>
+                <a:spcPct val="115000"/>
+              </a:lnSpc>
+              <a:spcBef>
+                <a:spcPts val="0"/>
+              </a:spcBef>
+              <a:buSzPct val="45833"/>
+              <a:buNone/>
+            </a:pPr>
+            <a:r>
+              <a:rPr lang="en-US" sz="1600" b="1" dirty="0">
+                <a:latin typeface="Times New Roman" panose="02020603050405020304" pitchFamily="18" charset="0"/>
+                <a:ea typeface="Cambria"/>
+                <a:cs typeface="Times New Roman" panose="02020603050405020304" pitchFamily="18" charset="0"/>
+                <a:sym typeface="Cambria"/>
+              </a:rPr>
+              <a:t>	</a:t>
+            </a:r>
+            <a:r>
+              <a:rPr lang="en-US" sz="1600" dirty="0">
+                <a:latin typeface="Times New Roman" panose="02020603050405020304" pitchFamily="18" charset="0"/>
+                <a:ea typeface="Cambria"/>
+                <a:cs typeface="Times New Roman" panose="02020603050405020304" pitchFamily="18" charset="0"/>
+                <a:sym typeface="Cambria"/>
+              </a:rPr>
+              <a:t>Faster R-CNN model delivers real-time device identification within 2-3 seconds via camera scanning with automatic disposal recommendations.</a:t>
+            </a:r>
+          </a:p>
+          <a:p>
+            <a:pPr marL="0" lvl="0" indent="0" algn="just">
+              <a:lnSpc>
+                <a:spcPct val="115000"/>
+              </a:lnSpc>
+              <a:spcBef>
+                <a:spcPts val="0"/>
+              </a:spcBef>
+              <a:buSzPct val="45833"/>
+              <a:buNone/>
+            </a:pPr>
+            <a:endParaRPr lang="en-US" sz="1600" dirty="0">
+              <a:latin typeface="Times New Roman" panose="02020603050405020304" pitchFamily="18" charset="0"/>
+              <a:ea typeface="Cambria"/>
+              <a:cs typeface="Times New Roman" panose="02020603050405020304" pitchFamily="18" charset="0"/>
+              <a:sym typeface="Cambria"/>
+            </a:endParaRPr>
+          </a:p>
+          <a:p>
+            <a:pPr marL="0" lvl="0" indent="0" algn="just">
+              <a:lnSpc>
+                <a:spcPct val="115000"/>
+              </a:lnSpc>
+              <a:spcBef>
+                <a:spcPts val="0"/>
+              </a:spcBef>
+              <a:buSzPct val="45833"/>
+              <a:buNone/>
+            </a:pPr>
+            <a:r>
+              <a:rPr lang="en-US" sz="1600" b="1" dirty="0">
+                <a:latin typeface="Times New Roman" panose="02020603050405020304" pitchFamily="18" charset="0"/>
+                <a:ea typeface="Cambria"/>
+                <a:cs typeface="Times New Roman" panose="02020603050405020304" pitchFamily="18" charset="0"/>
+                <a:sym typeface="Cambria"/>
+              </a:rPr>
+              <a:t>MULTI-STAKEHOLDER ECOSYSTEM</a:t>
+            </a:r>
+          </a:p>
+          <a:p>
+            <a:pPr marL="0" lvl="0" indent="0" algn="just">
+              <a:lnSpc>
+                <a:spcPct val="115000"/>
+              </a:lnSpc>
+              <a:spcBef>
+                <a:spcPts val="0"/>
+              </a:spcBef>
+              <a:buSzPct val="45833"/>
+              <a:buNone/>
+            </a:pPr>
+            <a:r>
+              <a:rPr lang="en-US" sz="1600" b="1" dirty="0">
+                <a:latin typeface="Times New Roman" panose="02020603050405020304" pitchFamily="18" charset="0"/>
+                <a:ea typeface="Cambria"/>
+                <a:cs typeface="Times New Roman" panose="02020603050405020304" pitchFamily="18" charset="0"/>
+                <a:sym typeface="Cambria"/>
+              </a:rPr>
+              <a:t>	</a:t>
+            </a:r>
+            <a:r>
+              <a:rPr lang="en-US" sz="1600" dirty="0">
+                <a:latin typeface="Times New Roman" panose="02020603050405020304" pitchFamily="18" charset="0"/>
+                <a:ea typeface="Cambria"/>
+                <a:cs typeface="Times New Roman" panose="02020603050405020304" pitchFamily="18" charset="0"/>
+                <a:sym typeface="Cambria"/>
+              </a:rPr>
+              <a:t>Specialized dashboards for Citizens, NGOs, Recycling Facilities, and Administrators with facility verification and booking management.</a:t>
+            </a:r>
+          </a:p>
+          <a:p>
+            <a:pPr marL="0" lvl="0" indent="0" algn="just">
+              <a:lnSpc>
+                <a:spcPct val="115000"/>
+              </a:lnSpc>
+              <a:spcBef>
+                <a:spcPts val="0"/>
+              </a:spcBef>
+              <a:buSzPct val="45833"/>
+              <a:buNone/>
+            </a:pPr>
+            <a:endParaRPr lang="en-US" sz="1600" dirty="0">
+              <a:latin typeface="Times New Roman" panose="02020603050405020304" pitchFamily="18" charset="0"/>
+              <a:ea typeface="Cambria"/>
+              <a:cs typeface="Times New Roman" panose="02020603050405020304" pitchFamily="18" charset="0"/>
+              <a:sym typeface="Cambria"/>
+            </a:endParaRPr>
+          </a:p>
+          <a:p>
+            <a:pPr marL="0" lvl="0" indent="0" algn="just">
+              <a:lnSpc>
+                <a:spcPct val="115000"/>
+              </a:lnSpc>
+              <a:spcBef>
+                <a:spcPts val="0"/>
+              </a:spcBef>
+              <a:buSzPct val="45833"/>
+              <a:buNone/>
+            </a:pPr>
+            <a:r>
+              <a:rPr lang="en-US" sz="1600" b="1" dirty="0">
+                <a:latin typeface="Times New Roman" panose="02020603050405020304" pitchFamily="18" charset="0"/>
+                <a:ea typeface="Cambria"/>
+                <a:cs typeface="Times New Roman" panose="02020603050405020304" pitchFamily="18" charset="0"/>
+                <a:sym typeface="Cambria"/>
+              </a:rPr>
+              <a:t>INTELLIGENT FACILITY MAPPING</a:t>
+            </a:r>
+          </a:p>
+          <a:p>
+            <a:pPr marL="0" lvl="0" indent="0" algn="just">
+              <a:lnSpc>
+                <a:spcPct val="115000"/>
+              </a:lnSpc>
+              <a:spcBef>
+                <a:spcPts val="0"/>
+              </a:spcBef>
+              <a:buSzPct val="45833"/>
+              <a:buNone/>
+            </a:pPr>
+            <a:r>
+              <a:rPr lang="en-US" sz="1600" b="1" dirty="0">
+                <a:latin typeface="Times New Roman" panose="02020603050405020304" pitchFamily="18" charset="0"/>
+                <a:ea typeface="Cambria"/>
+                <a:cs typeface="Times New Roman" panose="02020603050405020304" pitchFamily="18" charset="0"/>
+                <a:sym typeface="Cambria"/>
+              </a:rPr>
+              <a:t>	</a:t>
+            </a:r>
+            <a:r>
+              <a:rPr lang="en-US" sz="1600" dirty="0" err="1">
+                <a:latin typeface="Times New Roman" panose="02020603050405020304" pitchFamily="18" charset="0"/>
+                <a:ea typeface="Cambria"/>
+                <a:cs typeface="Times New Roman" panose="02020603050405020304" pitchFamily="18" charset="0"/>
+                <a:sym typeface="Cambria"/>
+              </a:rPr>
+              <a:t>MapBox</a:t>
+            </a:r>
+            <a:r>
+              <a:rPr lang="en-US" sz="1600" dirty="0">
+                <a:latin typeface="Times New Roman" panose="02020603050405020304" pitchFamily="18" charset="0"/>
+                <a:ea typeface="Cambria"/>
+                <a:cs typeface="Times New Roman" panose="02020603050405020304" pitchFamily="18" charset="0"/>
+                <a:sym typeface="Cambria"/>
+              </a:rPr>
+              <a:t> integration enables location-based discovery of certified e-waste centers with real-time navigation and proximity filtering.</a:t>
+            </a:r>
+          </a:p>
+          <a:p>
+            <a:pPr marL="0" lvl="0" indent="0" algn="just">
+              <a:lnSpc>
+                <a:spcPct val="115000"/>
+              </a:lnSpc>
+              <a:spcBef>
+                <a:spcPts val="0"/>
+              </a:spcBef>
+              <a:buSzPct val="45833"/>
+              <a:buNone/>
+            </a:pPr>
+            <a:endParaRPr lang="en-US" sz="1600" b="1" dirty="0">
+              <a:latin typeface="Times New Roman" panose="02020603050405020304" pitchFamily="18" charset="0"/>
+              <a:ea typeface="Cambria"/>
+              <a:cs typeface="Times New Roman" panose="02020603050405020304" pitchFamily="18" charset="0"/>
+              <a:sym typeface="Cambria"/>
+            </a:endParaRPr>
+          </a:p>
+          <a:p>
+            <a:pPr marL="0" lvl="0" indent="0" algn="just">
+              <a:lnSpc>
+                <a:spcPct val="115000"/>
+              </a:lnSpc>
+              <a:spcBef>
+                <a:spcPts val="0"/>
+              </a:spcBef>
+              <a:buSzPct val="45833"/>
+              <a:buNone/>
+            </a:pPr>
+            <a:r>
+              <a:rPr lang="en-US" sz="1600" b="1" dirty="0">
+                <a:latin typeface="Times New Roman" panose="02020603050405020304" pitchFamily="18" charset="0"/>
+                <a:ea typeface="Cambria"/>
+                <a:cs typeface="Times New Roman" panose="02020603050405020304" pitchFamily="18" charset="0"/>
+                <a:sym typeface="Cambria"/>
+              </a:rPr>
+              <a:t>GAMIFICATION &amp; IMPACT TRACKING</a:t>
+            </a:r>
+          </a:p>
+          <a:p>
+            <a:pPr marL="0" lvl="0" indent="0" algn="just">
+              <a:lnSpc>
+                <a:spcPct val="115000"/>
+              </a:lnSpc>
+              <a:spcBef>
+                <a:spcPts val="0"/>
+              </a:spcBef>
+              <a:buSzPct val="45833"/>
+              <a:buNone/>
+            </a:pPr>
+            <a:r>
+              <a:rPr lang="en-US" sz="1600" dirty="0">
+                <a:latin typeface="Times New Roman" panose="02020603050405020304" pitchFamily="18" charset="0"/>
+                <a:ea typeface="Cambria"/>
+                <a:cs typeface="Times New Roman" panose="02020603050405020304" pitchFamily="18" charset="0"/>
+                <a:sym typeface="Cambria"/>
+              </a:rPr>
+              <a:t>	Points-based rewards, leaderboards, and carbon footprint tracking (20kg CO2 saved per device) with digital certificates for sustained engagement.</a:t>
+            </a:r>
+          </a:p>
+          <a:p>
+            <a:pPr marL="0" lvl="0" indent="0" algn="just">
+              <a:lnSpc>
+                <a:spcPct val="115000"/>
+              </a:lnSpc>
+              <a:spcBef>
+                <a:spcPts val="0"/>
+              </a:spcBef>
+              <a:buSzPct val="45833"/>
+              <a:buNone/>
+            </a:pPr>
+            <a:endParaRPr lang="en-US" sz="1600" dirty="0">
+              <a:latin typeface="Times New Roman" panose="02020603050405020304" pitchFamily="18" charset="0"/>
+              <a:ea typeface="Cambria"/>
+              <a:cs typeface="Times New Roman" panose="02020603050405020304" pitchFamily="18" charset="0"/>
+              <a:sym typeface="Cambria"/>
+            </a:endParaRPr>
+          </a:p>
+          <a:p>
+            <a:pPr marL="0" lvl="0" indent="0" algn="just">
+              <a:lnSpc>
+                <a:spcPct val="115000"/>
+              </a:lnSpc>
+              <a:spcBef>
+                <a:spcPts val="0"/>
+              </a:spcBef>
+              <a:buSzPct val="45833"/>
+              <a:buNone/>
+            </a:pPr>
+            <a:r>
+              <a:rPr lang="en-US" sz="1600" b="1" dirty="0">
+                <a:latin typeface="Times New Roman" panose="02020603050405020304" pitchFamily="18" charset="0"/>
+                <a:ea typeface="Cambria"/>
+                <a:cs typeface="Times New Roman" panose="02020603050405020304" pitchFamily="18" charset="0"/>
+                <a:sym typeface="Cambria"/>
+              </a:rPr>
+              <a:t>SECURE &amp; COMPLIANT ARCHITECTURE</a:t>
+            </a:r>
+          </a:p>
+          <a:p>
+            <a:pPr marL="0" lvl="0" indent="0" algn="just">
+              <a:lnSpc>
+                <a:spcPct val="115000"/>
+              </a:lnSpc>
+              <a:spcBef>
+                <a:spcPts val="0"/>
+              </a:spcBef>
+              <a:buSzPct val="45833"/>
+              <a:buNone/>
+            </a:pPr>
+            <a:r>
+              <a:rPr lang="en-US" sz="1600" b="1" dirty="0">
+                <a:latin typeface="Times New Roman" panose="02020603050405020304" pitchFamily="18" charset="0"/>
+                <a:ea typeface="Cambria"/>
+                <a:cs typeface="Times New Roman" panose="02020603050405020304" pitchFamily="18" charset="0"/>
+                <a:sym typeface="Cambria"/>
+              </a:rPr>
+              <a:t>	</a:t>
+            </a:r>
+            <a:r>
+              <a:rPr lang="en-US" sz="1600" dirty="0">
+                <a:latin typeface="Times New Roman" panose="02020603050405020304" pitchFamily="18" charset="0"/>
+                <a:ea typeface="Cambria"/>
+                <a:cs typeface="Times New Roman" panose="02020603050405020304" pitchFamily="18" charset="0"/>
+                <a:sym typeface="Cambria"/>
+              </a:rPr>
+              <a:t>Auth0 JWT authentication, RBAC, GDPR compliance, deployed on </a:t>
+            </a:r>
+            <a:r>
+              <a:rPr lang="en-US" sz="1600" dirty="0" err="1">
+                <a:latin typeface="Times New Roman" panose="02020603050405020304" pitchFamily="18" charset="0"/>
+                <a:ea typeface="Cambria"/>
+                <a:cs typeface="Times New Roman" panose="02020603050405020304" pitchFamily="18" charset="0"/>
+                <a:sym typeface="Cambria"/>
+              </a:rPr>
+              <a:t>Vercel</a:t>
+            </a:r>
+            <a:r>
+              <a:rPr lang="en-US" sz="1600" dirty="0">
+                <a:latin typeface="Times New Roman" panose="02020603050405020304" pitchFamily="18" charset="0"/>
+                <a:ea typeface="Cambria"/>
+                <a:cs typeface="Times New Roman" panose="02020603050405020304" pitchFamily="18" charset="0"/>
+                <a:sym typeface="Cambria"/>
+              </a:rPr>
+              <a:t> and Railway with PostgreSQL/MongoDB ensuring 99.9% uptime.</a:t>
+            </a:r>
+          </a:p>
+          <a:p>
+            <a:pPr marL="0" lvl="0" indent="0" algn="just">
+              <a:lnSpc>
+                <a:spcPct val="115000"/>
+              </a:lnSpc>
+              <a:spcBef>
+                <a:spcPts val="0"/>
+              </a:spcBef>
+              <a:buSzPct val="45833"/>
+              <a:buNone/>
+            </a:pPr>
+            <a:endParaRPr lang="en-US" sz="1600" dirty="0">
+              <a:latin typeface="Times New Roman" panose="02020603050405020304" pitchFamily="18" charset="0"/>
+              <a:ea typeface="Cambria"/>
+              <a:cs typeface="Times New Roman" panose="02020603050405020304" pitchFamily="18" charset="0"/>
+              <a:sym typeface="Cambria"/>
+            </a:endParaRPr>
+          </a:p>
+          <a:p>
+            <a:pPr marL="0" lvl="0" indent="0" algn="just">
+              <a:lnSpc>
+                <a:spcPct val="115000"/>
+              </a:lnSpc>
+              <a:spcBef>
+                <a:spcPts val="0"/>
+              </a:spcBef>
+              <a:buSzPct val="45833"/>
+              <a:buNone/>
+            </a:pPr>
+            <a:endParaRPr sz="1600" dirty="0">
+              <a:latin typeface="Times New Roman" panose="02020603050405020304" pitchFamily="18" charset="0"/>
+              <a:ea typeface="Cambria"/>
+              <a:cs typeface="Times New Roman" panose="02020603050405020304" pitchFamily="18" charset="0"/>
               <a:sym typeface="Cambria"/>
             </a:endParaRPr>
           </a:p>
@@ -23195,7 +23609,7 @@
                 <a:cs typeface="Cambria"/>
                 <a:sym typeface="Cambria"/>
               </a:rPr>
-              <a:t>AIM &amp; OBJECTIVES OF THE PROJECT </a:t>
+              <a:t>ABSTRACT OF THE PROJECT </a:t>
             </a:r>
             <a:endParaRPr sz="2400" b="1" dirty="0">
               <a:solidFill>
@@ -23214,13 +23628,13 @@
   <p:clrMapOvr>
     <a:masterClrMapping/>
   </p:clrMapOvr>
-  <mc:AlternateContent xmlns:mc="http://schemas.openxmlformats.org/markup-compatibility/2006">
-    <mc:Choice xmlns:p14="http://schemas.microsoft.com/office/powerpoint/2010/main" Requires="p14">
+  <mc:AlternateContent xmlns:mc="http://schemas.openxmlformats.org/markup-compatibility/2006" xmlns:p14="http://schemas.microsoft.com/office/powerpoint/2010/main">
+    <mc:Choice Requires="p14">
       <p:transition spd="slow" p14:dur="1500">
         <p:split orient="vert"/>
       </p:transition>
     </mc:Choice>
-    <mc:Fallback>
+    <mc:Fallback xmlns="">
       <p:transition spd="slow">
         <p:split orient="vert"/>
       </p:transition>
@@ -23358,6 +23772,399 @@
   <p:cSld>
     <p:spTree>
       <p:nvGrpSpPr>
+        <p:cNvPr id="1" name="Shape 98">
+          <a:extLst>
+            <a:ext uri="{FF2B5EF4-FFF2-40B4-BE49-F238E27FC236}">
+              <a16:creationId xmlns:a16="http://schemas.microsoft.com/office/drawing/2014/main" id="{02904BC2-A200-3946-3FEA-CBF96B5C7238}"/>
+            </a:ext>
+          </a:extLst>
+        </p:cNvPr>
+        <p:cNvGrpSpPr/>
+        <p:nvPr/>
+      </p:nvGrpSpPr>
+      <p:grpSpPr>
+        <a:xfrm>
+          <a:off x="0" y="0"/>
+          <a:ext cx="0" cy="0"/>
+          <a:chOff x="0" y="0"/>
+          <a:chExt cx="0" cy="0"/>
+        </a:xfrm>
+      </p:grpSpPr>
+      <p:sp>
+        <p:nvSpPr>
+          <p:cNvPr id="99" name="Google Shape;99;p2">
+            <a:extLst>
+              <a:ext uri="{FF2B5EF4-FFF2-40B4-BE49-F238E27FC236}">
+                <a16:creationId xmlns:a16="http://schemas.microsoft.com/office/drawing/2014/main" id="{49E2EE1F-6560-545E-48D6-786ADD254236}"/>
+              </a:ext>
+            </a:extLst>
+          </p:cNvPr>
+          <p:cNvSpPr txBox="1">
+            <a:spLocks noGrp="1"/>
+          </p:cNvSpPr>
+          <p:nvPr>
+            <p:ph type="body" idx="1"/>
+          </p:nvPr>
+        </p:nvSpPr>
+        <p:spPr>
+          <a:xfrm>
+            <a:off x="838200" y="928099"/>
+            <a:ext cx="10515600" cy="5343392"/>
+          </a:xfrm>
+          <a:prstGeom prst="rect">
+            <a:avLst/>
+          </a:prstGeom>
+          <a:noFill/>
+          <a:ln w="9525" cap="flat" cmpd="sng">
+            <a:solidFill>
+              <a:srgbClr val="C00000"/>
+            </a:solidFill>
+            <a:prstDash val="solid"/>
+            <a:round/>
+            <a:headEnd type="none" w="sm" len="sm"/>
+            <a:tailEnd type="none" w="sm" len="sm"/>
+          </a:ln>
+        </p:spPr>
+        <p:txBody>
+          <a:bodyPr spcFirstLastPara="1" wrap="square" lIns="91425" tIns="45700" rIns="91425" bIns="45700" anchor="t" anchorCtr="0">
+            <a:normAutofit/>
+          </a:bodyPr>
+          <a:lstStyle/>
+          <a:p>
+            <a:pPr marL="0" lvl="0" indent="0" algn="just">
+              <a:lnSpc>
+                <a:spcPct val="115000"/>
+              </a:lnSpc>
+              <a:spcBef>
+                <a:spcPts val="0"/>
+              </a:spcBef>
+              <a:buSzPct val="45833"/>
+              <a:buNone/>
+            </a:pPr>
+            <a:r>
+              <a:rPr lang="en-US" sz="2400" dirty="0">
+                <a:solidFill>
+                  <a:srgbClr val="C00052"/>
+                </a:solidFill>
+                <a:latin typeface="Cambria"/>
+                <a:ea typeface="Cambria"/>
+                <a:cs typeface="Cambria"/>
+                <a:sym typeface="Cambria"/>
+              </a:rPr>
+              <a:t>	</a:t>
+            </a:r>
+            <a:r>
+              <a:rPr lang="en-US" sz="2000" dirty="0">
+                <a:latin typeface="Times New Roman" panose="02020603050405020304" pitchFamily="18" charset="0"/>
+                <a:ea typeface="Cambria"/>
+                <a:cs typeface="Times New Roman" panose="02020603050405020304" pitchFamily="18" charset="0"/>
+                <a:sym typeface="Cambria"/>
+              </a:rPr>
+              <a:t>The project aims to revolutionize e-waste management by creating a comprehensive platform that connects citizens with certified e-waste disposal facilities. By integrating advanced technologies including AI/ML, and real-time geolocation services, it provides users with an intelligent system to responsibly dispose of electronic waste, track their environmental impact, earn rewards, and contribute to reducing the global e-waste crisis while promoting environmental sustainability and regulatory compliance.</a:t>
+            </a:r>
+            <a:endParaRPr sz="2000" dirty="0">
+              <a:latin typeface="Times New Roman" panose="02020603050405020304" pitchFamily="18" charset="0"/>
+              <a:ea typeface="Cambria"/>
+              <a:cs typeface="Times New Roman" panose="02020603050405020304" pitchFamily="18" charset="0"/>
+              <a:sym typeface="Cambria"/>
+            </a:endParaRPr>
+          </a:p>
+        </p:txBody>
+      </p:sp>
+      <p:sp>
+        <p:nvSpPr>
+          <p:cNvPr id="102" name="Google Shape;102;p2">
+            <a:extLst>
+              <a:ext uri="{FF2B5EF4-FFF2-40B4-BE49-F238E27FC236}">
+                <a16:creationId xmlns:a16="http://schemas.microsoft.com/office/drawing/2014/main" id="{1A116019-4DB4-CC86-8566-B4584156D5A6}"/>
+              </a:ext>
+            </a:extLst>
+          </p:cNvPr>
+          <p:cNvSpPr txBox="1">
+            <a:spLocks noGrp="1"/>
+          </p:cNvSpPr>
+          <p:nvPr>
+            <p:ph type="sldNum" idx="12"/>
+          </p:nvPr>
+        </p:nvSpPr>
+        <p:spPr>
+          <a:xfrm>
+            <a:off x="8610600" y="6356350"/>
+            <a:ext cx="2743200" cy="365125"/>
+          </a:xfrm>
+          <a:prstGeom prst="rect">
+            <a:avLst/>
+          </a:prstGeom>
+          <a:noFill/>
+          <a:ln>
+            <a:noFill/>
+          </a:ln>
+        </p:spPr>
+        <p:txBody>
+          <a:bodyPr spcFirstLastPara="1" wrap="square" lIns="91425" tIns="45700" rIns="91425" bIns="45700" anchor="ctr" anchorCtr="0">
+            <a:noAutofit/>
+          </a:bodyPr>
+          <a:lstStyle/>
+          <a:p>
+            <a:pPr marL="0" lvl="0" indent="0" algn="r" rtl="0">
+              <a:lnSpc>
+                <a:spcPct val="100000"/>
+              </a:lnSpc>
+              <a:spcBef>
+                <a:spcPts val="0"/>
+              </a:spcBef>
+              <a:spcAft>
+                <a:spcPts val="0"/>
+              </a:spcAft>
+              <a:buSzPts val="1800"/>
+              <a:buNone/>
+            </a:pPr>
+            <a:fld id="{00000000-1234-1234-1234-123412341234}" type="slidenum">
+              <a:rPr lang="en-US" sz="1800" b="1">
+                <a:solidFill>
+                  <a:srgbClr val="385623"/>
+                </a:solidFill>
+              </a:rPr>
+              <a:t>3</a:t>
+            </a:fld>
+            <a:endParaRPr sz="1800" b="1">
+              <a:solidFill>
+                <a:srgbClr val="385623"/>
+              </a:solidFill>
+            </a:endParaRPr>
+          </a:p>
+        </p:txBody>
+      </p:sp>
+      <p:sp>
+        <p:nvSpPr>
+          <p:cNvPr id="103" name="Google Shape;103;p2">
+            <a:extLst>
+              <a:ext uri="{FF2B5EF4-FFF2-40B4-BE49-F238E27FC236}">
+                <a16:creationId xmlns:a16="http://schemas.microsoft.com/office/drawing/2014/main" id="{F985E17A-EC68-F94C-6C1D-D85B1650BCDF}"/>
+              </a:ext>
+            </a:extLst>
+          </p:cNvPr>
+          <p:cNvSpPr txBox="1">
+            <a:spLocks noGrp="1"/>
+          </p:cNvSpPr>
+          <p:nvPr>
+            <p:ph type="title"/>
+          </p:nvPr>
+        </p:nvSpPr>
+        <p:spPr>
+          <a:xfrm>
+            <a:off x="838200" y="351116"/>
+            <a:ext cx="10515600" cy="576983"/>
+          </a:xfrm>
+          <a:prstGeom prst="rect">
+            <a:avLst/>
+          </a:prstGeom>
+          <a:noFill/>
+          <a:ln>
+            <a:noFill/>
+          </a:ln>
+        </p:spPr>
+        <p:txBody>
+          <a:bodyPr spcFirstLastPara="1" wrap="square" lIns="91425" tIns="45700" rIns="91425" bIns="45700" anchor="ctr" anchorCtr="0">
+            <a:noAutofit/>
+          </a:bodyPr>
+          <a:lstStyle/>
+          <a:p>
+            <a:pPr marL="0" lvl="0" indent="0" algn="ctr" rtl="0">
+              <a:lnSpc>
+                <a:spcPct val="90000"/>
+              </a:lnSpc>
+              <a:spcBef>
+                <a:spcPts val="0"/>
+              </a:spcBef>
+              <a:spcAft>
+                <a:spcPts val="0"/>
+              </a:spcAft>
+              <a:buClr>
+                <a:srgbClr val="2F5496"/>
+              </a:buClr>
+              <a:buSzPts val="2400"/>
+              <a:buFont typeface="Cambria"/>
+              <a:buNone/>
+            </a:pPr>
+            <a:r>
+              <a:rPr lang="en-US" sz="2400" b="1" dirty="0">
+                <a:solidFill>
+                  <a:srgbClr val="2F5496"/>
+                </a:solidFill>
+                <a:latin typeface="Cambria"/>
+                <a:ea typeface="Cambria"/>
+                <a:cs typeface="Cambria"/>
+                <a:sym typeface="Cambria"/>
+              </a:rPr>
+              <a:t>AIM OF THE PROJECT </a:t>
+            </a:r>
+            <a:endParaRPr sz="2400" b="1" dirty="0">
+              <a:solidFill>
+                <a:srgbClr val="2F5496"/>
+              </a:solidFill>
+              <a:latin typeface="Cambria"/>
+              <a:ea typeface="Cambria"/>
+              <a:cs typeface="Cambria"/>
+              <a:sym typeface="Cambria"/>
+            </a:endParaRPr>
+          </a:p>
+        </p:txBody>
+      </p:sp>
+    </p:spTree>
+    <p:extLst>
+      <p:ext uri="{BB962C8B-B14F-4D97-AF65-F5344CB8AC3E}">
+        <p14:creationId xmlns:p14="http://schemas.microsoft.com/office/powerpoint/2010/main" val="1898496920"/>
+      </p:ext>
+    </p:extLst>
+  </p:cSld>
+  <p:clrMapOvr>
+    <a:masterClrMapping/>
+  </p:clrMapOvr>
+  <mc:AlternateContent xmlns:mc="http://schemas.openxmlformats.org/markup-compatibility/2006" xmlns:p14="http://schemas.microsoft.com/office/powerpoint/2010/main">
+    <mc:Choice Requires="p14">
+      <p:transition spd="slow" p14:dur="1500">
+        <p:split orient="vert"/>
+      </p:transition>
+    </mc:Choice>
+    <mc:Fallback xmlns="">
+      <p:transition spd="slow">
+        <p:split orient="vert"/>
+      </p:transition>
+    </mc:Fallback>
+  </mc:AlternateContent>
+  <p:timing>
+    <p:tnLst>
+      <p:par>
+        <p:cTn id="1" dur="indefinite" restart="never" nodeType="tmRoot">
+          <p:childTnLst>
+            <p:seq concurrent="1" nextAc="seek">
+              <p:cTn id="2" dur="indefinite" nodeType="mainSeq">
+                <p:childTnLst>
+                  <p:par>
+                    <p:cTn id="3" fill="hold">
+                      <p:stCondLst>
+                        <p:cond delay="indefinite"/>
+                      </p:stCondLst>
+                      <p:childTnLst>
+                        <p:par>
+                          <p:cTn id="4" fill="hold">
+                            <p:stCondLst>
+                              <p:cond delay="0"/>
+                            </p:stCondLst>
+                            <p:childTnLst>
+                              <p:par>
+                                <p:cTn id="5" presetID="2" presetClass="entr" presetSubtype="4" fill="hold" grpId="0" nodeType="clickEffect">
+                                  <p:stCondLst>
+                                    <p:cond delay="0"/>
+                                  </p:stCondLst>
+                                  <p:childTnLst>
+                                    <p:set>
+                                      <p:cBhvr>
+                                        <p:cTn id="6" dur="1" fill="hold">
+                                          <p:stCondLst>
+                                            <p:cond delay="0"/>
+                                          </p:stCondLst>
+                                        </p:cTn>
+                                        <p:tgtEl>
+                                          <p:spTgt spid="103"/>
+                                        </p:tgtEl>
+                                        <p:attrNameLst>
+                                          <p:attrName>style.visibility</p:attrName>
+                                        </p:attrNameLst>
+                                      </p:cBhvr>
+                                      <p:to>
+                                        <p:strVal val="visible"/>
+                                      </p:to>
+                                    </p:set>
+                                    <p:anim calcmode="lin" valueType="num">
+                                      <p:cBhvr additive="base">
+                                        <p:cTn id="7" dur="500" fill="hold"/>
+                                        <p:tgtEl>
+                                          <p:spTgt spid="103"/>
+                                        </p:tgtEl>
+                                        <p:attrNameLst>
+                                          <p:attrName>ppt_x</p:attrName>
+                                        </p:attrNameLst>
+                                      </p:cBhvr>
+                                      <p:tavLst>
+                                        <p:tav tm="0">
+                                          <p:val>
+                                            <p:strVal val="#ppt_x"/>
+                                          </p:val>
+                                        </p:tav>
+                                        <p:tav tm="100000">
+                                          <p:val>
+                                            <p:strVal val="#ppt_x"/>
+                                          </p:val>
+                                        </p:tav>
+                                      </p:tavLst>
+                                    </p:anim>
+                                    <p:anim calcmode="lin" valueType="num">
+                                      <p:cBhvr additive="base">
+                                        <p:cTn id="8" dur="500" fill="hold"/>
+                                        <p:tgtEl>
+                                          <p:spTgt spid="103"/>
+                                        </p:tgtEl>
+                                        <p:attrNameLst>
+                                          <p:attrName>ppt_y</p:attrName>
+                                        </p:attrNameLst>
+                                      </p:cBhvr>
+                                      <p:tavLst>
+                                        <p:tav tm="0">
+                                          <p:val>
+                                            <p:strVal val="1+#ppt_h/2"/>
+                                          </p:val>
+                                        </p:tav>
+                                        <p:tav tm="100000">
+                                          <p:val>
+                                            <p:strVal val="#ppt_y"/>
+                                          </p:val>
+                                        </p:tav>
+                                      </p:tavLst>
+                                    </p:anim>
+                                  </p:childTnLst>
+                                </p:cTn>
+                              </p:par>
+                            </p:childTnLst>
+                          </p:cTn>
+                        </p:par>
+                      </p:childTnLst>
+                    </p:cTn>
+                  </p:par>
+                </p:childTnLst>
+              </p:cTn>
+              <p:prevCondLst>
+                <p:cond evt="onPrev" delay="0">
+                  <p:tgtEl>
+                    <p:sldTgt/>
+                  </p:tgtEl>
+                </p:cond>
+              </p:prevCondLst>
+              <p:nextCondLst>
+                <p:cond evt="onNext" delay="0">
+                  <p:tgtEl>
+                    <p:sldTgt/>
+                  </p:tgtEl>
+                </p:cond>
+              </p:nextCondLst>
+            </p:seq>
+          </p:childTnLst>
+        </p:cTn>
+      </p:par>
+    </p:tnLst>
+    <p:bldLst>
+      <p:bldP spid="103" grpId="0"/>
+    </p:bldLst>
+  </p:timing>
+</p:sld>
+</file>
+
+<file path=ppt/slides/slide4.xml><?xml version="1.0" encoding="utf-8"?>
+<p:sld xmlns:a="http://schemas.openxmlformats.org/drawingml/2006/main" xmlns:r="http://schemas.openxmlformats.org/officeDocument/2006/relationships" xmlns:p="http://schemas.openxmlformats.org/presentationml/2006/main">
+  <p:cSld>
+    <p:spTree>
+      <p:nvGrpSpPr>
         <p:cNvPr id="1" name="Shape 98"/>
         <p:cNvGrpSpPr/>
         <p:nvPr/>
@@ -23884,7 +24691,7 @@
                   <a:srgbClr val="385623"/>
                 </a:solidFill>
               </a:rPr>
-              <a:t>3</a:t>
+              <a:t>4</a:t>
             </a:fld>
             <a:endParaRPr sz="1800" b="1">
               <a:solidFill>
@@ -23969,13 +24776,13 @@
   <p:clrMapOvr>
     <a:masterClrMapping/>
   </p:clrMapOvr>
-  <mc:AlternateContent xmlns:mc="http://schemas.openxmlformats.org/markup-compatibility/2006">
-    <mc:Choice xmlns:p14="http://schemas.microsoft.com/office/powerpoint/2010/main" Requires="p14">
+  <mc:AlternateContent xmlns:mc="http://schemas.openxmlformats.org/markup-compatibility/2006" xmlns:p14="http://schemas.microsoft.com/office/powerpoint/2010/main">
+    <mc:Choice Requires="p14">
       <p:transition spd="slow" p14:dur="1500">
         <p:split orient="vert"/>
       </p:transition>
     </mc:Choice>
-    <mc:Fallback>
+    <mc:Fallback xmlns="">
       <p:transition spd="slow">
         <p:split orient="vert"/>
       </p:transition>
@@ -23984,7 +24791,7 @@
 </p:sld>
 </file>
 
-<file path=ppt/slides/slide4.xml><?xml version="1.0" encoding="utf-8"?>
+<file path=ppt/slides/slide5.xml><?xml version="1.0" encoding="utf-8"?>
 <p:sld xmlns:a="http://schemas.openxmlformats.org/drawingml/2006/main" xmlns:r="http://schemas.openxmlformats.org/officeDocument/2006/relationships" xmlns:p="http://schemas.openxmlformats.org/presentationml/2006/main">
   <p:cSld>
     <p:spTree>
@@ -24322,7 +25129,7 @@
                   <a:srgbClr val="385623"/>
                 </a:solidFill>
               </a:rPr>
-              <a:t>4</a:t>
+              <a:t>5</a:t>
             </a:fld>
             <a:endParaRPr sz="1800" b="1">
               <a:solidFill>
@@ -24387,13 +25194,13 @@
   <p:clrMapOvr>
     <a:masterClrMapping/>
   </p:clrMapOvr>
-  <mc:AlternateContent xmlns:mc="http://schemas.openxmlformats.org/markup-compatibility/2006">
-    <mc:Choice xmlns:p14="http://schemas.microsoft.com/office/powerpoint/2010/main" Requires="p14">
+  <mc:AlternateContent xmlns:mc="http://schemas.openxmlformats.org/markup-compatibility/2006" xmlns:p14="http://schemas.microsoft.com/office/powerpoint/2010/main">
+    <mc:Choice Requires="p14">
       <p:transition spd="slow" p14:dur="1500">
         <p:split orient="vert"/>
       </p:transition>
     </mc:Choice>
-    <mc:Fallback>
+    <mc:Fallback xmlns="">
       <p:transition spd="slow">
         <p:split orient="vert"/>
       </p:transition>
@@ -24402,7 +25209,7 @@
 </p:sld>
 </file>
 
-<file path=ppt/slides/slide5.xml><?xml version="1.0" encoding="utf-8"?>
+<file path=ppt/slides/slide6.xml><?xml version="1.0" encoding="utf-8"?>
 <p:sld xmlns:a="http://schemas.openxmlformats.org/drawingml/2006/main" xmlns:r="http://schemas.openxmlformats.org/officeDocument/2006/relationships" xmlns:p="http://schemas.openxmlformats.org/presentationml/2006/main">
   <p:cSld>
     <p:spTree>
@@ -24537,7 +25344,7 @@
                   <a:schemeClr val="accent6"/>
                 </a:solidFill>
               </a:rPr>
-              <a:t>5</a:t>
+              <a:t>6</a:t>
             </a:fld>
             <a:endParaRPr sz="1800" b="1" dirty="0">
               <a:solidFill>
@@ -26116,13 +26923,13 @@
   <p:clrMapOvr>
     <a:masterClrMapping/>
   </p:clrMapOvr>
-  <mc:AlternateContent xmlns:mc="http://schemas.openxmlformats.org/markup-compatibility/2006">
-    <mc:Choice xmlns:p14="http://schemas.microsoft.com/office/powerpoint/2010/main" Requires="p14">
+  <mc:AlternateContent xmlns:mc="http://schemas.openxmlformats.org/markup-compatibility/2006" xmlns:p14="http://schemas.microsoft.com/office/powerpoint/2010/main">
+    <mc:Choice Requires="p14">
       <p:transition spd="slow" p14:dur="1500">
         <p:split orient="vert"/>
       </p:transition>
     </mc:Choice>
-    <mc:Fallback>
+    <mc:Fallback xmlns="">
       <p:transition spd="slow">
         <p:split orient="vert"/>
       </p:transition>
@@ -26131,7 +26938,7 @@
 </p:sld>
 </file>
 
-<file path=ppt/slides/slide6.xml><?xml version="1.0" encoding="utf-8"?>
+<file path=ppt/slides/slide7.xml><?xml version="1.0" encoding="utf-8"?>
 <p:sld xmlns:a="http://schemas.openxmlformats.org/drawingml/2006/main" xmlns:r="http://schemas.openxmlformats.org/officeDocument/2006/relationships" xmlns:p="http://schemas.openxmlformats.org/presentationml/2006/main">
   <p:cSld>
     <p:spTree>
@@ -26266,7 +27073,7 @@
                   <a:schemeClr val="accent6"/>
                 </a:solidFill>
               </a:rPr>
-              <a:t>6</a:t>
+              <a:t>7</a:t>
             </a:fld>
             <a:endParaRPr sz="1800" b="1" dirty="0">
               <a:solidFill>
@@ -27825,13 +28632,13 @@
   <p:clrMapOvr>
     <a:masterClrMapping/>
   </p:clrMapOvr>
-  <mc:AlternateContent xmlns:mc="http://schemas.openxmlformats.org/markup-compatibility/2006">
-    <mc:Choice xmlns:p14="http://schemas.microsoft.com/office/powerpoint/2010/main" Requires="p14">
+  <mc:AlternateContent xmlns:mc="http://schemas.openxmlformats.org/markup-compatibility/2006" xmlns:p14="http://schemas.microsoft.com/office/powerpoint/2010/main">
+    <mc:Choice Requires="p14">
       <p:transition spd="slow" p14:dur="1500">
         <p:split orient="vert"/>
       </p:transition>
     </mc:Choice>
-    <mc:Fallback>
+    <mc:Fallback xmlns="">
       <p:transition spd="slow">
         <p:split orient="vert"/>
       </p:transition>
@@ -27840,7 +28647,7 @@
 </p:sld>
 </file>
 
-<file path=ppt/slides/slide7.xml><?xml version="1.0" encoding="utf-8"?>
+<file path=ppt/slides/slide8.xml><?xml version="1.0" encoding="utf-8"?>
 <p:sld xmlns:a="http://schemas.openxmlformats.org/drawingml/2006/main" xmlns:r="http://schemas.openxmlformats.org/officeDocument/2006/relationships" xmlns:p="http://schemas.openxmlformats.org/presentationml/2006/main">
   <p:cSld>
     <p:spTree>
@@ -28146,7 +28953,7 @@
                   <a:srgbClr val="385623"/>
                 </a:solidFill>
               </a:rPr>
-              <a:t>7</a:t>
+              <a:t>8</a:t>
             </a:fld>
             <a:endParaRPr sz="1800" b="1">
               <a:solidFill>
@@ -28242,13 +29049,13 @@
   <p:clrMapOvr>
     <a:masterClrMapping/>
   </p:clrMapOvr>
-  <mc:AlternateContent xmlns:mc="http://schemas.openxmlformats.org/markup-compatibility/2006">
-    <mc:Choice xmlns:p14="http://schemas.microsoft.com/office/powerpoint/2010/main" Requires="p14">
+  <mc:AlternateContent xmlns:mc="http://schemas.openxmlformats.org/markup-compatibility/2006" xmlns:p14="http://schemas.microsoft.com/office/powerpoint/2010/main">
+    <mc:Choice Requires="p14">
       <p:transition spd="slow" p14:dur="1500">
         <p:split orient="vert"/>
       </p:transition>
     </mc:Choice>
-    <mc:Fallback>
+    <mc:Fallback xmlns="">
       <p:transition spd="slow">
         <p:split orient="vert"/>
       </p:transition>
@@ -28257,7 +29064,7 @@
 </p:sld>
 </file>
 
-<file path=ppt/slides/slide8.xml><?xml version="1.0" encoding="utf-8"?>
+<file path=ppt/slides/slide9.xml><?xml version="1.0" encoding="utf-8"?>
 <p:sld xmlns:a="http://schemas.openxmlformats.org/drawingml/2006/main" xmlns:r="http://schemas.openxmlformats.org/officeDocument/2006/relationships" xmlns:p="http://schemas.openxmlformats.org/presentationml/2006/main">
   <p:cSld>
     <p:spTree>
@@ -28418,7 +29225,7 @@
                   <a:srgbClr val="385623"/>
                 </a:solidFill>
               </a:rPr>
-              <a:t>8</a:t>
+              <a:t>9</a:t>
             </a:fld>
             <a:endParaRPr sz="1800" b="1">
               <a:solidFill>
@@ -28503,500 +29310,13 @@
   <p:clrMapOvr>
     <a:masterClrMapping/>
   </p:clrMapOvr>
-  <mc:AlternateContent xmlns:mc="http://schemas.openxmlformats.org/markup-compatibility/2006">
-    <mc:Choice xmlns:p14="http://schemas.microsoft.com/office/powerpoint/2010/main" Requires="p14">
+  <mc:AlternateContent xmlns:mc="http://schemas.openxmlformats.org/markup-compatibility/2006" xmlns:p14="http://schemas.microsoft.com/office/powerpoint/2010/main">
+    <mc:Choice Requires="p14">
       <p:transition spd="slow" p14:dur="1500">
         <p:split orient="vert"/>
       </p:transition>
     </mc:Choice>
-    <mc:Fallback>
-      <p:transition spd="slow">
-        <p:split orient="vert"/>
-      </p:transition>
-    </mc:Fallback>
-  </mc:AlternateContent>
-</p:sld>
-</file>
-
-<file path=ppt/slides/slide9.xml><?xml version="1.0" encoding="utf-8"?>
-<p:sld xmlns:a="http://schemas.openxmlformats.org/drawingml/2006/main" xmlns:r="http://schemas.openxmlformats.org/officeDocument/2006/relationships" xmlns:p="http://schemas.openxmlformats.org/presentationml/2006/main">
-  <p:cSld>
-    <p:spTree>
-      <p:nvGrpSpPr>
-        <p:cNvPr id="1" name="Shape 133"/>
-        <p:cNvGrpSpPr/>
-        <p:nvPr/>
-      </p:nvGrpSpPr>
-      <p:grpSpPr>
-        <a:xfrm>
-          <a:off x="0" y="0"/>
-          <a:ext cx="0" cy="0"/>
-          <a:chOff x="0" y="0"/>
-          <a:chExt cx="0" cy="0"/>
-        </a:xfrm>
-      </p:grpSpPr>
-      <p:sp>
-        <p:nvSpPr>
-          <p:cNvPr id="134" name="Google Shape;134;p7"/>
-          <p:cNvSpPr txBox="1">
-            <a:spLocks noGrp="1"/>
-          </p:cNvSpPr>
-          <p:nvPr>
-            <p:ph type="body" idx="1"/>
-          </p:nvPr>
-        </p:nvSpPr>
-        <p:spPr>
-          <a:xfrm>
-            <a:off x="838199" y="775855"/>
-            <a:ext cx="10674927" cy="5444836"/>
-          </a:xfrm>
-          <a:prstGeom prst="rect">
-            <a:avLst/>
-          </a:prstGeom>
-          <a:noFill/>
-          <a:ln w="9525" cap="flat" cmpd="sng">
-            <a:solidFill>
-              <a:srgbClr val="C00000"/>
-            </a:solidFill>
-            <a:prstDash val="solid"/>
-            <a:round/>
-            <a:headEnd type="none" w="sm" len="sm"/>
-            <a:tailEnd type="none" w="sm" len="sm"/>
-          </a:ln>
-        </p:spPr>
-        <p:txBody>
-          <a:bodyPr spcFirstLastPara="1" wrap="square" lIns="91425" tIns="45700" rIns="91425" bIns="45700" anchor="t" anchorCtr="0">
-            <a:normAutofit/>
-          </a:bodyPr>
-          <a:lstStyle/>
-          <a:p>
-            <a:pPr marL="114300" lvl="0" indent="0" algn="l" rtl="0">
-              <a:lnSpc>
-                <a:spcPct val="90000"/>
-              </a:lnSpc>
-              <a:spcBef>
-                <a:spcPts val="1000"/>
-              </a:spcBef>
-              <a:spcAft>
-                <a:spcPts val="0"/>
-              </a:spcAft>
-              <a:buSzPts val="1800"/>
-              <a:buNone/>
-            </a:pPr>
-            <a:r>
-              <a:rPr lang="en-US" sz="2400" b="1" dirty="0">
-                <a:solidFill>
-                  <a:srgbClr val="C00000"/>
-                </a:solidFill>
-                <a:latin typeface="Cambria"/>
-                <a:ea typeface="Cambria"/>
-                <a:cs typeface="Cambria"/>
-                <a:sym typeface="Cambria"/>
-              </a:rPr>
-              <a:t>Technical &amp; Operational Feasibility:</a:t>
-            </a:r>
-            <a:endParaRPr sz="2400" b="1" dirty="0">
-              <a:solidFill>
-                <a:srgbClr val="C00000"/>
-              </a:solidFill>
-              <a:latin typeface="Cambria"/>
-              <a:ea typeface="Cambria"/>
-              <a:cs typeface="Cambria"/>
-              <a:sym typeface="Cambria"/>
-            </a:endParaRPr>
-          </a:p>
-          <a:p>
-            <a:pPr marL="457200" lvl="0" indent="-342900" algn="l" rtl="0">
-              <a:lnSpc>
-                <a:spcPct val="90000"/>
-              </a:lnSpc>
-              <a:spcBef>
-                <a:spcPts val="1000"/>
-              </a:spcBef>
-              <a:spcAft>
-                <a:spcPts val="0"/>
-              </a:spcAft>
-              <a:buClr>
-                <a:schemeClr val="dk1"/>
-              </a:buClr>
-              <a:buSzPts val="1800"/>
-              <a:buChar char="•"/>
-            </a:pPr>
-            <a:r>
-              <a:rPr lang="en-US" sz="2000" b="1" dirty="0">
-                <a:latin typeface="Cambria"/>
-                <a:ea typeface="Cambria"/>
-                <a:cs typeface="Cambria"/>
-                <a:sym typeface="Cambria"/>
-              </a:rPr>
-              <a:t>Technologies:</a:t>
-            </a:r>
-            <a:r>
-              <a:rPr lang="en-US" sz="2000" dirty="0">
-                <a:latin typeface="Cambria"/>
-                <a:ea typeface="Cambria"/>
-                <a:cs typeface="Cambria"/>
-                <a:sym typeface="Cambria"/>
-              </a:rPr>
-              <a:t> The project utilizes advanced tools like FRCNN and EAST, which are mature and capable of real-time detection of dark patterns. Available AI frameworks and libraries support this.</a:t>
-            </a:r>
-            <a:r>
-              <a:rPr lang="en-US" sz="2000" b="1" dirty="0">
-                <a:solidFill>
-                  <a:srgbClr val="C00000"/>
-                </a:solidFill>
-                <a:latin typeface="Cambria"/>
-                <a:ea typeface="Cambria"/>
-                <a:cs typeface="Cambria"/>
-                <a:sym typeface="Cambria"/>
-              </a:rPr>
-              <a:t> </a:t>
-            </a:r>
-            <a:r>
-              <a:rPr lang="en-US" sz="2000" dirty="0">
-                <a:latin typeface="Cambria"/>
-                <a:ea typeface="Cambria"/>
-                <a:cs typeface="Cambria"/>
-                <a:sym typeface="Cambria"/>
-              </a:rPr>
-              <a:t>It Requires access to high-quality data and computing power (GPUs or cloud services) for training models.</a:t>
-            </a:r>
-            <a:endParaRPr dirty="0"/>
-          </a:p>
-          <a:p>
-            <a:pPr marL="457200" lvl="0" indent="-342900" algn="l" rtl="0">
-              <a:lnSpc>
-                <a:spcPct val="90000"/>
-              </a:lnSpc>
-              <a:spcBef>
-                <a:spcPts val="1000"/>
-              </a:spcBef>
-              <a:spcAft>
-                <a:spcPts val="0"/>
-              </a:spcAft>
-              <a:buClr>
-                <a:schemeClr val="dk1"/>
-              </a:buClr>
-              <a:buSzPts val="1800"/>
-              <a:buChar char="•"/>
-            </a:pPr>
-            <a:r>
-              <a:rPr lang="en-US" sz="2000" b="1" dirty="0">
-                <a:latin typeface="Cambria"/>
-                <a:ea typeface="Cambria"/>
-                <a:cs typeface="Cambria"/>
-                <a:sym typeface="Cambria"/>
-              </a:rPr>
-              <a:t>Integration:</a:t>
-            </a:r>
-            <a:r>
-              <a:rPr lang="en-US" sz="2000" dirty="0">
-                <a:latin typeface="Cambria"/>
-                <a:ea typeface="Cambria"/>
-                <a:cs typeface="Cambria"/>
-                <a:sym typeface="Cambria"/>
-              </a:rPr>
-              <a:t> Can be easily implemented as an add-on or embedded in e-commerce platforms, with real-time alerts enhancing user experience.</a:t>
-            </a:r>
-            <a:endParaRPr dirty="0"/>
-          </a:p>
-          <a:p>
-            <a:pPr marL="457200" lvl="0" indent="-342900" algn="l" rtl="0">
-              <a:lnSpc>
-                <a:spcPct val="90000"/>
-              </a:lnSpc>
-              <a:spcBef>
-                <a:spcPts val="1000"/>
-              </a:spcBef>
-              <a:spcAft>
-                <a:spcPts val="0"/>
-              </a:spcAft>
-              <a:buClr>
-                <a:schemeClr val="dk1"/>
-              </a:buClr>
-              <a:buSzPts val="1800"/>
-              <a:buChar char="•"/>
-            </a:pPr>
-            <a:r>
-              <a:rPr lang="en-US" sz="2000" b="1" dirty="0">
-                <a:latin typeface="Cambria"/>
-                <a:ea typeface="Cambria"/>
-                <a:cs typeface="Cambria"/>
-                <a:sym typeface="Cambria"/>
-              </a:rPr>
-              <a:t>Challenges:</a:t>
-            </a:r>
-            <a:r>
-              <a:rPr lang="en-US" sz="2000" dirty="0">
-                <a:latin typeface="Cambria"/>
-                <a:ea typeface="Cambria"/>
-                <a:cs typeface="Cambria"/>
-                <a:sym typeface="Cambria"/>
-              </a:rPr>
-              <a:t> Significant computing resources for model accuracy and cross-platform integration might pose hurdles, along with maintaining updates to stay relevant.</a:t>
-            </a:r>
-            <a:endParaRPr dirty="0"/>
-          </a:p>
-          <a:p>
-            <a:pPr marL="114300" lvl="0" indent="0" algn="l" rtl="0">
-              <a:lnSpc>
-                <a:spcPct val="90000"/>
-              </a:lnSpc>
-              <a:spcBef>
-                <a:spcPts val="1000"/>
-              </a:spcBef>
-              <a:spcAft>
-                <a:spcPts val="0"/>
-              </a:spcAft>
-              <a:buSzPts val="1800"/>
-              <a:buNone/>
-            </a:pPr>
-            <a:r>
-              <a:rPr lang="en-US" sz="2400" b="1" dirty="0">
-                <a:solidFill>
-                  <a:srgbClr val="C00000"/>
-                </a:solidFill>
-                <a:latin typeface="Cambria"/>
-                <a:ea typeface="Cambria"/>
-                <a:cs typeface="Cambria"/>
-                <a:sym typeface="Cambria"/>
-              </a:rPr>
-              <a:t>Financial &amp; Legal Feasibility:</a:t>
-            </a:r>
-            <a:endParaRPr dirty="0"/>
-          </a:p>
-          <a:p>
-            <a:pPr marL="457200" lvl="0" indent="-342900" algn="l" rtl="0">
-              <a:lnSpc>
-                <a:spcPct val="90000"/>
-              </a:lnSpc>
-              <a:spcBef>
-                <a:spcPts val="1000"/>
-              </a:spcBef>
-              <a:spcAft>
-                <a:spcPts val="0"/>
-              </a:spcAft>
-              <a:buClr>
-                <a:schemeClr val="dk1"/>
-              </a:buClr>
-              <a:buSzPts val="1800"/>
-              <a:buChar char="•"/>
-            </a:pPr>
-            <a:r>
-              <a:rPr lang="en-US" sz="2000" b="1" dirty="0">
-                <a:latin typeface="Cambria"/>
-                <a:ea typeface="Cambria"/>
-                <a:cs typeface="Cambria"/>
-                <a:sym typeface="Cambria"/>
-              </a:rPr>
-              <a:t>Cost &amp; ROI:</a:t>
-            </a:r>
-            <a:r>
-              <a:rPr lang="en-US" sz="2000" dirty="0">
-                <a:latin typeface="Cambria"/>
-                <a:ea typeface="Cambria"/>
-                <a:cs typeface="Cambria"/>
-                <a:sym typeface="Cambria"/>
-              </a:rPr>
-              <a:t> Initial development and cloud infrastructure costs are expected. Potential revenue can be generated through licensing or SaaS models. Reducing dark patterns may improve user retention, benefiting e-commerce platforms.</a:t>
-            </a:r>
-            <a:endParaRPr sz="2000" b="1" dirty="0">
-              <a:solidFill>
-                <a:srgbClr val="C00000"/>
-              </a:solidFill>
-              <a:latin typeface="Cambria"/>
-              <a:ea typeface="Cambria"/>
-              <a:cs typeface="Cambria"/>
-              <a:sym typeface="Cambria"/>
-            </a:endParaRPr>
-          </a:p>
-          <a:p>
-            <a:pPr marL="457200" lvl="0" indent="-342900" algn="l" rtl="0">
-              <a:lnSpc>
-                <a:spcPct val="90000"/>
-              </a:lnSpc>
-              <a:spcBef>
-                <a:spcPts val="1000"/>
-              </a:spcBef>
-              <a:spcAft>
-                <a:spcPts val="0"/>
-              </a:spcAft>
-              <a:buClr>
-                <a:schemeClr val="dk1"/>
-              </a:buClr>
-              <a:buSzPts val="1800"/>
-              <a:buChar char="•"/>
-            </a:pPr>
-            <a:r>
-              <a:rPr lang="en-US" sz="2000" b="1" dirty="0">
-                <a:latin typeface="Cambria"/>
-                <a:ea typeface="Cambria"/>
-                <a:cs typeface="Cambria"/>
-                <a:sym typeface="Cambria"/>
-              </a:rPr>
-              <a:t>Challenges:</a:t>
-            </a:r>
-            <a:r>
-              <a:rPr lang="en-US" sz="2000" dirty="0">
-                <a:latin typeface="Cambria"/>
-                <a:ea typeface="Cambria"/>
-                <a:cs typeface="Cambria"/>
-                <a:sym typeface="Cambria"/>
-              </a:rPr>
-              <a:t> Some platforms may hesitate due to upfront costs, and strict data privacy measures are required to avoid legal risks.</a:t>
-            </a:r>
-            <a:endParaRPr sz="2000" b="1" dirty="0">
-              <a:solidFill>
-                <a:srgbClr val="C00000"/>
-              </a:solidFill>
-              <a:latin typeface="Cambria"/>
-              <a:ea typeface="Cambria"/>
-              <a:cs typeface="Cambria"/>
-              <a:sym typeface="Cambria"/>
-            </a:endParaRPr>
-          </a:p>
-        </p:txBody>
-      </p:sp>
-      <p:sp>
-        <p:nvSpPr>
-          <p:cNvPr id="135" name="Google Shape;135;p7"/>
-          <p:cNvSpPr txBox="1">
-            <a:spLocks noGrp="1"/>
-          </p:cNvSpPr>
-          <p:nvPr>
-            <p:ph type="title"/>
-          </p:nvPr>
-        </p:nvSpPr>
-        <p:spPr>
-          <a:xfrm>
-            <a:off x="838200" y="240434"/>
-            <a:ext cx="10515600" cy="438439"/>
-          </a:xfrm>
-          <a:prstGeom prst="rect">
-            <a:avLst/>
-          </a:prstGeom>
-          <a:noFill/>
-          <a:ln>
-            <a:noFill/>
-          </a:ln>
-        </p:spPr>
-        <p:txBody>
-          <a:bodyPr spcFirstLastPara="1" wrap="square" lIns="91425" tIns="45700" rIns="91425" bIns="45700" anchor="ctr" anchorCtr="0">
-            <a:noAutofit/>
-          </a:bodyPr>
-          <a:lstStyle/>
-          <a:p>
-            <a:pPr marL="0" lvl="0" indent="0" algn="ctr" rtl="0">
-              <a:lnSpc>
-                <a:spcPct val="90000"/>
-              </a:lnSpc>
-              <a:spcBef>
-                <a:spcPts val="0"/>
-              </a:spcBef>
-              <a:spcAft>
-                <a:spcPts val="0"/>
-              </a:spcAft>
-              <a:buClr>
-                <a:srgbClr val="2F5496"/>
-              </a:buClr>
-              <a:buSzPts val="2400"/>
-              <a:buFont typeface="Cambria"/>
-              <a:buNone/>
-            </a:pPr>
-            <a:r>
-              <a:rPr lang="en-US" sz="2400" b="1">
-                <a:solidFill>
-                  <a:srgbClr val="2F5496"/>
-                </a:solidFill>
-                <a:latin typeface="Cambria"/>
-                <a:ea typeface="Cambria"/>
-                <a:cs typeface="Cambria"/>
-                <a:sym typeface="Cambria"/>
-              </a:rPr>
-              <a:t>FEASIBILITY ANALYSIS </a:t>
-            </a:r>
-            <a:endParaRPr sz="2400" b="1">
-              <a:solidFill>
-                <a:srgbClr val="2F5496"/>
-              </a:solidFill>
-              <a:latin typeface="Cambria"/>
-              <a:ea typeface="Cambria"/>
-              <a:cs typeface="Cambria"/>
-              <a:sym typeface="Cambria"/>
-            </a:endParaRPr>
-          </a:p>
-        </p:txBody>
-      </p:sp>
-      <p:sp>
-        <p:nvSpPr>
-          <p:cNvPr id="136" name="Google Shape;136;p7"/>
-          <p:cNvSpPr txBox="1">
-            <a:spLocks noGrp="1"/>
-          </p:cNvSpPr>
-          <p:nvPr>
-            <p:ph type="sldNum" idx="12"/>
-          </p:nvPr>
-        </p:nvSpPr>
-        <p:spPr>
-          <a:xfrm>
-            <a:off x="8610600" y="6356350"/>
-            <a:ext cx="2743200" cy="365125"/>
-          </a:xfrm>
-          <a:prstGeom prst="rect">
-            <a:avLst/>
-          </a:prstGeom>
-          <a:noFill/>
-          <a:ln>
-            <a:noFill/>
-          </a:ln>
-        </p:spPr>
-        <p:txBody>
-          <a:bodyPr spcFirstLastPara="1" wrap="square" lIns="91425" tIns="45700" rIns="91425" bIns="45700" anchor="ctr" anchorCtr="0">
-            <a:noAutofit/>
-          </a:bodyPr>
-          <a:lstStyle/>
-          <a:p>
-            <a:pPr marL="0" lvl="0" indent="0" algn="r" rtl="0">
-              <a:lnSpc>
-                <a:spcPct val="100000"/>
-              </a:lnSpc>
-              <a:spcBef>
-                <a:spcPts val="0"/>
-              </a:spcBef>
-              <a:spcAft>
-                <a:spcPts val="0"/>
-              </a:spcAft>
-              <a:buSzPts val="1800"/>
-              <a:buNone/>
-            </a:pPr>
-            <a:fld id="{00000000-1234-1234-1234-123412341234}" type="slidenum">
-              <a:rPr lang="en-US" sz="1800" b="1">
-                <a:solidFill>
-                  <a:srgbClr val="385623"/>
-                </a:solidFill>
-              </a:rPr>
-              <a:t>9</a:t>
-            </a:fld>
-            <a:endParaRPr sz="1800" b="1">
-              <a:solidFill>
-                <a:srgbClr val="385623"/>
-              </a:solidFill>
-            </a:endParaRPr>
-          </a:p>
-        </p:txBody>
-      </p:sp>
-    </p:spTree>
-  </p:cSld>
-  <p:clrMapOvr>
-    <a:masterClrMapping/>
-  </p:clrMapOvr>
-  <mc:AlternateContent xmlns:mc="http://schemas.openxmlformats.org/markup-compatibility/2006">
-    <mc:Choice xmlns:p14="http://schemas.microsoft.com/office/powerpoint/2010/main" Requires="p14">
-      <p:transition spd="slow" p14:dur="1500">
-        <p:split orient="vert"/>
-      </p:transition>
-    </mc:Choice>
-    <mc:Fallback>
+    <mc:Fallback xmlns="">
       <p:transition spd="slow">
         <p:split orient="vert"/>
       </p:transition>

</xml_diff>